<commit_message>
add lectPlan 7, 8
</commit_message>
<xml_diff>
--- a/PPT/1차시.pptx
+++ b/PPT/1차시.pptx
@@ -138,6 +138,10 @@
 </p:presentation>
 </file>
 
+<file path=ppt/revisionInfo.xml><?xml version="1.0" encoding="utf-8"?>
+<p1510:revInfo xmlns:a="http://schemas.openxmlformats.org/drawingml/2006/main" xmlns:r="http://schemas.openxmlformats.org/officeDocument/2006/relationships" xmlns:p1510="http://schemas.microsoft.com/office/powerpoint/2015/10/main"/>
+</file>
+
 <file path=ppt/notesMasters/notesMaster1.xml><?xml version="1.0" encoding="utf-8"?>
 <p:notesMaster xmlns:a="http://schemas.openxmlformats.org/drawingml/2006/main" xmlns:r="http://schemas.openxmlformats.org/officeDocument/2006/relationships" xmlns:p="http://schemas.openxmlformats.org/presentationml/2006/main">
   <p:cSld>
@@ -220,7 +224,7 @@
           <a:p>
             <a:fld id="{B8039FB8-6F18-436D-9454-D1944E32D5DF}" type="datetimeFigureOut">
               <a:rPr lang="ko-KR" altLang="en-US" smtClean="0"/>
-              <a:t>2017-11-18</a:t>
+              <a:t>2017-12-03</a:t>
             </a:fld>
             <a:endParaRPr lang="ko-KR" altLang="en-US"/>
           </a:p>
@@ -284,38 +288,37 @@
           <a:p>
             <a:pPr lvl="0"/>
             <a:r>
-              <a:rPr lang="ko-KR" altLang="en-US" smtClean="0"/>
+              <a:rPr lang="ko-KR" altLang="en-US"/>
               <a:t>마스터 텍스트 스타일 편집</a:t>
             </a:r>
           </a:p>
           <a:p>
             <a:pPr lvl="1"/>
             <a:r>
-              <a:rPr lang="ko-KR" altLang="en-US" smtClean="0"/>
+              <a:rPr lang="ko-KR" altLang="en-US"/>
               <a:t>둘째 수준</a:t>
             </a:r>
           </a:p>
           <a:p>
             <a:pPr lvl="2"/>
             <a:r>
-              <a:rPr lang="ko-KR" altLang="en-US" smtClean="0"/>
+              <a:rPr lang="ko-KR" altLang="en-US"/>
               <a:t>셋째 수준</a:t>
             </a:r>
           </a:p>
           <a:p>
             <a:pPr lvl="3"/>
             <a:r>
-              <a:rPr lang="ko-KR" altLang="en-US" smtClean="0"/>
+              <a:rPr lang="ko-KR" altLang="en-US"/>
               <a:t>넷째 수준</a:t>
             </a:r>
           </a:p>
           <a:p>
             <a:pPr lvl="4"/>
             <a:r>
-              <a:rPr lang="ko-KR" altLang="en-US" smtClean="0"/>
+              <a:rPr lang="ko-KR" altLang="en-US"/>
               <a:t>다섯째 수준</a:t>
             </a:r>
-            <a:endParaRPr lang="ko-KR" altLang="en-US"/>
           </a:p>
         </p:txBody>
       </p:sp>
@@ -530,10 +533,9 @@
           </a:lstStyle>
           <a:p>
             <a:r>
-              <a:rPr lang="ko-KR" altLang="en-US" smtClean="0"/>
+              <a:rPr lang="ko-KR" altLang="en-US"/>
               <a:t>마스터 제목 스타일 편집</a:t>
             </a:r>
-            <a:endParaRPr lang="ko-KR" altLang="en-US"/>
           </a:p>
         </p:txBody>
       </p:sp>
@@ -595,10 +597,9 @@
           </a:lstStyle>
           <a:p>
             <a:r>
-              <a:rPr lang="ko-KR" altLang="en-US" smtClean="0"/>
+              <a:rPr lang="ko-KR" altLang="en-US"/>
               <a:t>클릭하여 마스터 부제목 스타일 편집</a:t>
             </a:r>
-            <a:endParaRPr lang="ko-KR" altLang="en-US"/>
           </a:p>
         </p:txBody>
       </p:sp>
@@ -618,7 +619,7 @@
           <a:lstStyle/>
           <a:p>
             <a:r>
-              <a:rPr lang="en-US" altLang="ko-KR" smtClean="0"/>
+              <a:rPr lang="en-US" altLang="ko-KR"/>
               <a:t>2017</a:t>
             </a:r>
             <a:endParaRPr lang="ko-KR" altLang="en-US" dirty="0"/>
@@ -641,11 +642,11 @@
           <a:lstStyle/>
           <a:p>
             <a:r>
-              <a:rPr lang="en-US" altLang="ko-KR" smtClean="0"/>
+              <a:rPr lang="en-US" altLang="ko-KR"/>
               <a:t>C#</a:t>
             </a:r>
             <a:r>
-              <a:rPr lang="ko-KR" altLang="en-US" smtClean="0"/>
+              <a:rPr lang="ko-KR" altLang="en-US"/>
               <a:t>으로 클리커 게임 만들기</a:t>
             </a:r>
             <a:endParaRPr lang="ko-KR" altLang="en-US" dirty="0"/>
@@ -686,13 +687,6 @@
   <p:clrMapOvr>
     <a:masterClrMapping/>
   </p:clrMapOvr>
-  <p:timing>
-    <p:tnLst>
-      <p:par>
-        <p:cTn id="1" dur="indefinite" restart="never" nodeType="tmRoot"/>
-      </p:par>
-    </p:tnLst>
-  </p:timing>
   <p:hf hdr="0"/>
 </p:sldLayout>
 </file>
@@ -730,21 +724,94 @@
           <a:lstStyle/>
           <a:p>
             <a:r>
-              <a:rPr lang="ko-KR" altLang="en-US" smtClean="0"/>
+              <a:rPr lang="ko-KR" altLang="en-US"/>
               <a:t>마스터 제목 스타일 편집</a:t>
             </a:r>
+          </a:p>
+        </p:txBody>
+      </p:sp>
+      <p:sp>
+        <p:nvSpPr>
+          <p:cNvPr id="3" name="내용 개체 틀 2"/>
+          <p:cNvSpPr>
+            <a:spLocks noGrp="1"/>
+          </p:cNvSpPr>
+          <p:nvPr>
+            <p:ph idx="1"/>
+          </p:nvPr>
+        </p:nvSpPr>
+        <p:spPr/>
+        <p:txBody>
+          <a:bodyPr/>
+          <a:lstStyle/>
+          <a:p>
+            <a:pPr lvl="0"/>
+            <a:r>
+              <a:rPr lang="ko-KR" altLang="en-US"/>
+              <a:t>마스터 텍스트 스타일 편집</a:t>
+            </a:r>
+          </a:p>
+          <a:p>
+            <a:pPr lvl="1"/>
+            <a:r>
+              <a:rPr lang="ko-KR" altLang="en-US"/>
+              <a:t>둘째 수준</a:t>
+            </a:r>
+          </a:p>
+          <a:p>
+            <a:pPr lvl="2"/>
+            <a:r>
+              <a:rPr lang="ko-KR" altLang="en-US"/>
+              <a:t>셋째 수준</a:t>
+            </a:r>
+          </a:p>
+          <a:p>
+            <a:pPr lvl="3"/>
+            <a:r>
+              <a:rPr lang="ko-KR" altLang="en-US"/>
+              <a:t>넷째 수준</a:t>
+            </a:r>
+          </a:p>
+          <a:p>
+            <a:pPr lvl="4"/>
+            <a:r>
+              <a:rPr lang="ko-KR" altLang="en-US"/>
+              <a:t>다섯째 수준</a:t>
+            </a:r>
+          </a:p>
+        </p:txBody>
+      </p:sp>
+      <p:sp>
+        <p:nvSpPr>
+          <p:cNvPr id="4" name="날짜 개체 틀 3"/>
+          <p:cNvSpPr>
+            <a:spLocks noGrp="1"/>
+          </p:cNvSpPr>
+          <p:nvPr>
+            <p:ph type="dt" sz="half" idx="10"/>
+          </p:nvPr>
+        </p:nvSpPr>
+        <p:spPr/>
+        <p:txBody>
+          <a:bodyPr/>
+          <a:lstStyle/>
+          <a:p>
+            <a:r>
+              <a:rPr lang="en-US" altLang="ko-KR"/>
+              <a:t>2017</a:t>
+            </a:r>
             <a:endParaRPr lang="ko-KR" altLang="en-US"/>
           </a:p>
         </p:txBody>
       </p:sp>
       <p:sp>
         <p:nvSpPr>
-          <p:cNvPr id="3" name="내용 개체 틀 2"/>
-          <p:cNvSpPr>
-            <a:spLocks noGrp="1"/>
-          </p:cNvSpPr>
-          <p:nvPr>
-            <p:ph idx="1"/>
+          <p:cNvPr id="5" name="바닥글 개체 틀 4"/>
+          <p:cNvSpPr>
+            <a:spLocks noGrp="1"/>
+          </p:cNvSpPr>
+          <p:nvPr>
+            <p:ph type="ftr" sz="quarter" idx="11"/>
           </p:nvPr>
         </p:nvSpPr>
         <p:spPr/>
@@ -752,87 +819,12 @@
           <a:bodyPr/>
           <a:lstStyle/>
           <a:p>
-            <a:pPr lvl="0"/>
-            <a:r>
-              <a:rPr lang="ko-KR" altLang="en-US" smtClean="0"/>
-              <a:t>마스터 텍스트 스타일 편집</a:t>
-            </a:r>
-          </a:p>
-          <a:p>
-            <a:pPr lvl="1"/>
-            <a:r>
-              <a:rPr lang="ko-KR" altLang="en-US" smtClean="0"/>
-              <a:t>둘째 수준</a:t>
-            </a:r>
-          </a:p>
-          <a:p>
-            <a:pPr lvl="2"/>
-            <a:r>
-              <a:rPr lang="ko-KR" altLang="en-US" smtClean="0"/>
-              <a:t>셋째 수준</a:t>
-            </a:r>
-          </a:p>
-          <a:p>
-            <a:pPr lvl="3"/>
-            <a:r>
-              <a:rPr lang="ko-KR" altLang="en-US" smtClean="0"/>
-              <a:t>넷째 수준</a:t>
-            </a:r>
-          </a:p>
-          <a:p>
-            <a:pPr lvl="4"/>
-            <a:r>
-              <a:rPr lang="ko-KR" altLang="en-US" smtClean="0"/>
-              <a:t>다섯째 수준</a:t>
-            </a:r>
-            <a:endParaRPr lang="ko-KR" altLang="en-US"/>
-          </a:p>
-        </p:txBody>
-      </p:sp>
-      <p:sp>
-        <p:nvSpPr>
-          <p:cNvPr id="4" name="날짜 개체 틀 3"/>
-          <p:cNvSpPr>
-            <a:spLocks noGrp="1"/>
-          </p:cNvSpPr>
-          <p:nvPr>
-            <p:ph type="dt" sz="half" idx="10"/>
-          </p:nvPr>
-        </p:nvSpPr>
-        <p:spPr/>
-        <p:txBody>
-          <a:bodyPr/>
-          <a:lstStyle/>
-          <a:p>
-            <a:r>
-              <a:rPr lang="en-US" altLang="ko-KR" smtClean="0"/>
-              <a:t>2017</a:t>
-            </a:r>
-            <a:endParaRPr lang="ko-KR" altLang="en-US"/>
-          </a:p>
-        </p:txBody>
-      </p:sp>
-      <p:sp>
-        <p:nvSpPr>
-          <p:cNvPr id="5" name="바닥글 개체 틀 4"/>
-          <p:cNvSpPr>
-            <a:spLocks noGrp="1"/>
-          </p:cNvSpPr>
-          <p:nvPr>
-            <p:ph type="ftr" sz="quarter" idx="11"/>
-          </p:nvPr>
-        </p:nvSpPr>
-        <p:spPr/>
-        <p:txBody>
-          <a:bodyPr/>
-          <a:lstStyle/>
-          <a:p>
-            <a:r>
-              <a:rPr lang="en-US" altLang="ko-KR" smtClean="0"/>
+            <a:r>
+              <a:rPr lang="en-US" altLang="ko-KR"/>
               <a:t>C#</a:t>
             </a:r>
             <a:r>
-              <a:rPr lang="ko-KR" altLang="en-US" smtClean="0"/>
+              <a:rPr lang="ko-KR" altLang="en-US"/>
               <a:t>으로 클리커 게임 만들기</a:t>
             </a:r>
             <a:endParaRPr lang="ko-KR" altLang="en-US" dirty="0"/>
@@ -898,13 +890,6 @@
   <p:transition>
     <p:push dir="u"/>
   </p:transition>
-  <p:timing>
-    <p:tnLst>
-      <p:par>
-        <p:cTn id="1" dur="indefinite" restart="never" nodeType="tmRoot"/>
-      </p:par>
-    </p:tnLst>
-  </p:timing>
 </p:sldLayout>
 </file>
 
@@ -941,10 +926,9 @@
           <a:lstStyle/>
           <a:p>
             <a:r>
-              <a:rPr lang="ko-KR" altLang="en-US" smtClean="0"/>
+              <a:rPr lang="ko-KR" altLang="en-US"/>
               <a:t>마스터 제목 스타일 편집</a:t>
             </a:r>
-            <a:endParaRPr lang="ko-KR" altLang="en-US"/>
           </a:p>
         </p:txBody>
       </p:sp>
@@ -970,38 +954,37 @@
           <a:p>
             <a:pPr lvl="0"/>
             <a:r>
-              <a:rPr lang="ko-KR" altLang="en-US" smtClean="0"/>
+              <a:rPr lang="ko-KR" altLang="en-US"/>
               <a:t>마스터 텍스트 스타일 편집</a:t>
             </a:r>
           </a:p>
           <a:p>
             <a:pPr lvl="1"/>
             <a:r>
-              <a:rPr lang="ko-KR" altLang="en-US" smtClean="0"/>
+              <a:rPr lang="ko-KR" altLang="en-US"/>
               <a:t>둘째 수준</a:t>
             </a:r>
           </a:p>
           <a:p>
             <a:pPr lvl="2"/>
             <a:r>
-              <a:rPr lang="ko-KR" altLang="en-US" smtClean="0"/>
+              <a:rPr lang="ko-KR" altLang="en-US"/>
               <a:t>셋째 수준</a:t>
             </a:r>
           </a:p>
           <a:p>
             <a:pPr lvl="3"/>
             <a:r>
-              <a:rPr lang="ko-KR" altLang="en-US" smtClean="0"/>
+              <a:rPr lang="ko-KR" altLang="en-US"/>
               <a:t>넷째 수준</a:t>
             </a:r>
           </a:p>
           <a:p>
             <a:pPr lvl="4"/>
             <a:r>
-              <a:rPr lang="ko-KR" altLang="en-US" smtClean="0"/>
+              <a:rPr lang="ko-KR" altLang="en-US"/>
               <a:t>다섯째 수준</a:t>
             </a:r>
-            <a:endParaRPr lang="ko-KR" altLang="en-US"/>
           </a:p>
         </p:txBody>
       </p:sp>
@@ -1027,49 +1010,71 @@
           <a:p>
             <a:pPr lvl="0"/>
             <a:r>
-              <a:rPr lang="ko-KR" altLang="en-US" smtClean="0"/>
+              <a:rPr lang="ko-KR" altLang="en-US"/>
               <a:t>마스터 텍스트 스타일 편집</a:t>
             </a:r>
           </a:p>
           <a:p>
             <a:pPr lvl="1"/>
             <a:r>
-              <a:rPr lang="ko-KR" altLang="en-US" smtClean="0"/>
+              <a:rPr lang="ko-KR" altLang="en-US"/>
               <a:t>둘째 수준</a:t>
             </a:r>
           </a:p>
           <a:p>
             <a:pPr lvl="2"/>
             <a:r>
-              <a:rPr lang="ko-KR" altLang="en-US" smtClean="0"/>
+              <a:rPr lang="ko-KR" altLang="en-US"/>
               <a:t>셋째 수준</a:t>
             </a:r>
           </a:p>
           <a:p>
             <a:pPr lvl="3"/>
             <a:r>
-              <a:rPr lang="ko-KR" altLang="en-US" smtClean="0"/>
+              <a:rPr lang="ko-KR" altLang="en-US"/>
               <a:t>넷째 수준</a:t>
             </a:r>
           </a:p>
           <a:p>
             <a:pPr lvl="4"/>
             <a:r>
-              <a:rPr lang="ko-KR" altLang="en-US" smtClean="0"/>
+              <a:rPr lang="ko-KR" altLang="en-US"/>
               <a:t>다섯째 수준</a:t>
             </a:r>
+          </a:p>
+        </p:txBody>
+      </p:sp>
+      <p:sp>
+        <p:nvSpPr>
+          <p:cNvPr id="5" name="날짜 개체 틀 4"/>
+          <p:cNvSpPr>
+            <a:spLocks noGrp="1"/>
+          </p:cNvSpPr>
+          <p:nvPr>
+            <p:ph type="dt" sz="half" idx="10"/>
+          </p:nvPr>
+        </p:nvSpPr>
+        <p:spPr/>
+        <p:txBody>
+          <a:bodyPr/>
+          <a:lstStyle/>
+          <a:p>
+            <a:r>
+              <a:rPr lang="en-US" altLang="ko-KR"/>
+              <a:t>2017</a:t>
+            </a:r>
             <a:endParaRPr lang="ko-KR" altLang="en-US"/>
           </a:p>
         </p:txBody>
       </p:sp>
       <p:sp>
         <p:nvSpPr>
-          <p:cNvPr id="5" name="날짜 개체 틀 4"/>
-          <p:cNvSpPr>
-            <a:spLocks noGrp="1"/>
-          </p:cNvSpPr>
-          <p:nvPr>
-            <p:ph type="dt" sz="half" idx="10"/>
+          <p:cNvPr id="6" name="바닥글 개체 틀 5"/>
+          <p:cNvSpPr>
+            <a:spLocks noGrp="1"/>
+          </p:cNvSpPr>
+          <p:nvPr>
+            <p:ph type="ftr" sz="quarter" idx="11"/>
           </p:nvPr>
         </p:nvSpPr>
         <p:spPr/>
@@ -1078,37 +1083,13 @@
           <a:lstStyle/>
           <a:p>
             <a:r>
-              <a:rPr lang="en-US" altLang="ko-KR" smtClean="0"/>
-              <a:t>2017</a:t>
-            </a:r>
-            <a:endParaRPr lang="ko-KR" altLang="en-US"/>
-          </a:p>
-        </p:txBody>
-      </p:sp>
-      <p:sp>
-        <p:nvSpPr>
-          <p:cNvPr id="6" name="바닥글 개체 틀 5"/>
-          <p:cNvSpPr>
-            <a:spLocks noGrp="1"/>
-          </p:cNvSpPr>
-          <p:nvPr>
-            <p:ph type="ftr" sz="quarter" idx="11"/>
-          </p:nvPr>
-        </p:nvSpPr>
-        <p:spPr/>
-        <p:txBody>
-          <a:bodyPr/>
-          <a:lstStyle/>
-          <a:p>
-            <a:r>
-              <a:rPr lang="en-US" altLang="ko-KR" smtClean="0"/>
+              <a:rPr lang="en-US" altLang="ko-KR"/>
               <a:t>C#</a:t>
             </a:r>
             <a:r>
-              <a:rPr lang="ko-KR" altLang="en-US" smtClean="0"/>
+              <a:rPr lang="ko-KR" altLang="en-US"/>
               <a:t>으로 클리커 게임 만들기</a:t>
             </a:r>
-            <a:endParaRPr lang="ko-KR" altLang="en-US"/>
           </a:p>
         </p:txBody>
       </p:sp>
@@ -1168,13 +1149,6 @@
   <p:clrMapOvr>
     <a:masterClrMapping/>
   </p:clrMapOvr>
-  <p:timing>
-    <p:tnLst>
-      <p:par>
-        <p:cTn id="1" dur="indefinite" restart="never" nodeType="tmRoot"/>
-      </p:par>
-    </p:tnLst>
-  </p:timing>
 </p:sldLayout>
 </file>
 
@@ -1220,10 +1194,9 @@
           </a:lstStyle>
           <a:p>
             <a:r>
-              <a:rPr lang="ko-KR" altLang="en-US" smtClean="0"/>
+              <a:rPr lang="ko-KR" altLang="en-US"/>
               <a:t>마스터 제목 스타일 편집</a:t>
             </a:r>
-            <a:endParaRPr lang="ko-KR" altLang="en-US"/>
           </a:p>
         </p:txBody>
       </p:sp>
@@ -1277,38 +1250,37 @@
           <a:p>
             <a:pPr lvl="0"/>
             <a:r>
-              <a:rPr lang="ko-KR" altLang="en-US" smtClean="0"/>
+              <a:rPr lang="ko-KR" altLang="en-US"/>
               <a:t>마스터 텍스트 스타일 편집</a:t>
             </a:r>
           </a:p>
           <a:p>
             <a:pPr lvl="1"/>
             <a:r>
-              <a:rPr lang="ko-KR" altLang="en-US" smtClean="0"/>
+              <a:rPr lang="ko-KR" altLang="en-US"/>
               <a:t>둘째 수준</a:t>
             </a:r>
           </a:p>
           <a:p>
             <a:pPr lvl="2"/>
             <a:r>
-              <a:rPr lang="ko-KR" altLang="en-US" smtClean="0"/>
+              <a:rPr lang="ko-KR" altLang="en-US"/>
               <a:t>셋째 수준</a:t>
             </a:r>
           </a:p>
           <a:p>
             <a:pPr lvl="3"/>
             <a:r>
-              <a:rPr lang="ko-KR" altLang="en-US" smtClean="0"/>
+              <a:rPr lang="ko-KR" altLang="en-US"/>
               <a:t>넷째 수준</a:t>
             </a:r>
           </a:p>
           <a:p>
             <a:pPr lvl="4"/>
             <a:r>
-              <a:rPr lang="ko-KR" altLang="en-US" smtClean="0"/>
+              <a:rPr lang="ko-KR" altLang="en-US"/>
               <a:t>다섯째 수준</a:t>
             </a:r>
-            <a:endParaRPr lang="ko-KR" altLang="en-US"/>
           </a:p>
         </p:txBody>
       </p:sp>
@@ -1371,7 +1343,7 @@
           <a:p>
             <a:pPr lvl="0"/>
             <a:r>
-              <a:rPr lang="ko-KR" altLang="en-US" smtClean="0"/>
+              <a:rPr lang="ko-KR" altLang="en-US"/>
               <a:t>마스터 텍스트 스타일 편집</a:t>
             </a:r>
           </a:p>
@@ -1393,7 +1365,7 @@
           <a:lstStyle/>
           <a:p>
             <a:r>
-              <a:rPr lang="en-US" altLang="ko-KR" smtClean="0"/>
+              <a:rPr lang="en-US" altLang="ko-KR"/>
               <a:t>2017</a:t>
             </a:r>
             <a:endParaRPr lang="ko-KR" altLang="en-US"/>
@@ -1416,14 +1388,13 @@
           <a:lstStyle/>
           <a:p>
             <a:r>
-              <a:rPr lang="en-US" altLang="ko-KR" smtClean="0"/>
+              <a:rPr lang="en-US" altLang="ko-KR"/>
               <a:t>C#</a:t>
             </a:r>
             <a:r>
-              <a:rPr lang="ko-KR" altLang="en-US" smtClean="0"/>
+              <a:rPr lang="ko-KR" altLang="en-US"/>
               <a:t>으로 클리커 게임 만들기</a:t>
             </a:r>
-            <a:endParaRPr lang="ko-KR" altLang="en-US"/>
           </a:p>
         </p:txBody>
       </p:sp>
@@ -1483,13 +1454,6 @@
   <p:clrMapOvr>
     <a:masterClrMapping/>
   </p:clrMapOvr>
-  <p:timing>
-    <p:tnLst>
-      <p:par>
-        <p:cTn id="1" dur="indefinite" restart="never" nodeType="tmRoot"/>
-      </p:par>
-    </p:tnLst>
-  </p:timing>
 </p:sldLayout>
 </file>
 
@@ -1592,7 +1556,7 @@
           </a:lstStyle>
           <a:p>
             <a:r>
-              <a:rPr lang="ko-KR" altLang="en-US" smtClean="0"/>
+              <a:rPr lang="ko-KR" altLang="en-US"/>
               <a:t>주제</a:t>
             </a:r>
             <a:endParaRPr lang="ko-KR" altLang="en-US" dirty="0"/>
@@ -1615,7 +1579,7 @@
           <a:lstStyle/>
           <a:p>
             <a:r>
-              <a:rPr lang="en-US" altLang="ko-KR" smtClean="0"/>
+              <a:rPr lang="en-US" altLang="ko-KR"/>
               <a:t>2017</a:t>
             </a:r>
             <a:endParaRPr lang="ko-KR" altLang="en-US" dirty="0"/>
@@ -1638,11 +1602,11 @@
           <a:lstStyle/>
           <a:p>
             <a:r>
-              <a:rPr lang="en-US" altLang="ko-KR" smtClean="0"/>
+              <a:rPr lang="en-US" altLang="ko-KR"/>
               <a:t>C#</a:t>
             </a:r>
             <a:r>
-              <a:rPr lang="ko-KR" altLang="en-US" smtClean="0"/>
+              <a:rPr lang="ko-KR" altLang="en-US"/>
               <a:t>으로 클리커 게임 만들기</a:t>
             </a:r>
             <a:endParaRPr lang="ko-KR" altLang="en-US" dirty="0"/>
@@ -1734,7 +1698,7 @@
           <a:p>
             <a:pPr lvl="0"/>
             <a:r>
-              <a:rPr lang="ko-KR" altLang="en-US" dirty="0" err="1" smtClean="0"/>
+              <a:rPr lang="ko-KR" altLang="en-US" dirty="0" err="1"/>
               <a:t>부주제</a:t>
             </a:r>
             <a:endParaRPr lang="ko-KR" altLang="en-US" dirty="0"/>
@@ -1751,13 +1715,6 @@
   <p:clrMapOvr>
     <a:masterClrMapping/>
   </p:clrMapOvr>
-  <p:timing>
-    <p:tnLst>
-      <p:par>
-        <p:cTn id="1" dur="indefinite" restart="never" nodeType="tmRoot"/>
-      </p:par>
-    </p:tnLst>
-  </p:timing>
 </p:sldLayout>
 </file>
 
@@ -1890,7 +1847,7 @@
           <a:lstStyle/>
           <a:p>
             <a:r>
-              <a:rPr lang="en-US" altLang="ko-KR" smtClean="0"/>
+              <a:rPr lang="en-US" altLang="ko-KR"/>
               <a:t>2017</a:t>
             </a:r>
             <a:endParaRPr lang="ko-KR" altLang="en-US" dirty="0"/>
@@ -1913,11 +1870,11 @@
           <a:lstStyle/>
           <a:p>
             <a:r>
-              <a:rPr lang="en-US" altLang="ko-KR" smtClean="0"/>
+              <a:rPr lang="en-US" altLang="ko-KR"/>
               <a:t>C#</a:t>
             </a:r>
             <a:r>
-              <a:rPr lang="ko-KR" altLang="en-US" smtClean="0"/>
+              <a:rPr lang="ko-KR" altLang="en-US"/>
               <a:t>으로 클리커 게임 만들기</a:t>
             </a:r>
             <a:endParaRPr lang="ko-KR" altLang="en-US" dirty="0"/>
@@ -1988,13 +1945,6 @@
   <p:clrMapOvr>
     <a:masterClrMapping/>
   </p:clrMapOvr>
-  <p:timing>
-    <p:tnLst>
-      <p:par>
-        <p:cTn id="1" dur="indefinite" restart="never" nodeType="tmRoot"/>
-      </p:par>
-    </p:tnLst>
-  </p:timing>
 </p:sldLayout>
 </file>
 
@@ -2102,7 +2052,7 @@
           </a:lstStyle>
           <a:p>
             <a:r>
-              <a:rPr lang="en-US" altLang="ko-KR" smtClean="0"/>
+              <a:rPr lang="en-US" altLang="ko-KR"/>
               <a:t>2017</a:t>
             </a:r>
             <a:endParaRPr lang="ko-KR" altLang="en-US" dirty="0"/>
@@ -2133,22 +2083,21 @@
           </a:lstStyle>
           <a:p>
             <a:r>
-              <a:rPr lang="en-US" altLang="ko-KR" dirty="0" smtClean="0"/>
+              <a:rPr lang="en-US" altLang="ko-KR" dirty="0"/>
               <a:t>C#</a:t>
             </a:r>
             <a:r>
-              <a:rPr lang="ko-KR" altLang="en-US" dirty="0" smtClean="0"/>
+              <a:rPr lang="ko-KR" altLang="en-US" dirty="0"/>
               <a:t>으로 </a:t>
             </a:r>
             <a:r>
-              <a:rPr lang="ko-KR" altLang="en-US" dirty="0" err="1" smtClean="0"/>
+              <a:rPr lang="ko-KR" altLang="en-US" dirty="0" err="1"/>
               <a:t>클리커</a:t>
             </a:r>
             <a:r>
-              <a:rPr lang="ko-KR" altLang="en-US" dirty="0" smtClean="0"/>
+              <a:rPr lang="ko-KR" altLang="en-US" dirty="0"/>
               <a:t> 게임 만들기</a:t>
             </a:r>
-            <a:endParaRPr lang="ko-KR" altLang="en-US" dirty="0"/>
           </a:p>
         </p:txBody>
       </p:sp>
@@ -2251,7 +2200,7 @@
           </a:lstStyle>
           <a:p>
             <a:r>
-              <a:rPr lang="ko-KR" altLang="en-US" sz="4400" baseline="0" dirty="0" smtClean="0">
+              <a:rPr lang="ko-KR" altLang="en-US" sz="4400" baseline="0" dirty="0">
                 <a:solidFill>
                   <a:schemeClr val="tx1">
                     <a:lumMod val="75000"/>
@@ -2296,38 +2245,37 @@
           <a:p>
             <a:pPr lvl="0"/>
             <a:r>
-              <a:rPr lang="ko-KR" altLang="en-US" dirty="0" smtClean="0"/>
+              <a:rPr lang="ko-KR" altLang="en-US" dirty="0"/>
               <a:t>마스터 텍스트 스타일 편집</a:t>
             </a:r>
           </a:p>
           <a:p>
             <a:pPr lvl="1"/>
             <a:r>
-              <a:rPr lang="ko-KR" altLang="en-US" dirty="0" smtClean="0"/>
+              <a:rPr lang="ko-KR" altLang="en-US" dirty="0"/>
               <a:t>둘째 수준</a:t>
             </a:r>
           </a:p>
           <a:p>
             <a:pPr lvl="2"/>
             <a:r>
-              <a:rPr lang="ko-KR" altLang="en-US" dirty="0" smtClean="0"/>
+              <a:rPr lang="ko-KR" altLang="en-US" dirty="0"/>
               <a:t>셋째 수준</a:t>
             </a:r>
           </a:p>
           <a:p>
             <a:pPr lvl="3"/>
             <a:r>
-              <a:rPr lang="ko-KR" altLang="en-US" dirty="0" smtClean="0"/>
+              <a:rPr lang="ko-KR" altLang="en-US" dirty="0"/>
               <a:t>넷째 수준</a:t>
             </a:r>
           </a:p>
           <a:p>
             <a:pPr lvl="4"/>
             <a:r>
-              <a:rPr lang="ko-KR" altLang="en-US" dirty="0" smtClean="0"/>
+              <a:rPr lang="ko-KR" altLang="en-US" dirty="0"/>
               <a:t>다섯째 수준</a:t>
             </a:r>
-            <a:endParaRPr lang="ko-KR" altLang="en-US" dirty="0"/>
           </a:p>
         </p:txBody>
       </p:sp>
@@ -2341,13 +2289,6 @@
   <p:clrMapOvr>
     <a:masterClrMapping/>
   </p:clrMapOvr>
-  <p:timing>
-    <p:tnLst>
-      <p:par>
-        <p:cTn id="1" dur="indefinite" restart="never" nodeType="tmRoot"/>
-      </p:par>
-    </p:tnLst>
-  </p:timing>
 </p:sldLayout>
 </file>
 
@@ -2408,13 +2349,6 @@
   <p:clrMapOvr>
     <a:masterClrMapping/>
   </p:clrMapOvr>
-  <p:timing>
-    <p:tnLst>
-      <p:par>
-        <p:cTn id="1" dur="indefinite" restart="never" nodeType="tmRoot"/>
-      </p:par>
-    </p:tnLst>
-  </p:timing>
 </p:sldLayout>
 </file>
 
@@ -2514,7 +2448,7 @@
           </a:lstStyle>
           <a:p>
             <a:r>
-              <a:rPr lang="en-US" altLang="ko-KR" smtClean="0"/>
+              <a:rPr lang="en-US" altLang="ko-KR"/>
               <a:t>2017</a:t>
             </a:r>
             <a:endParaRPr lang="ko-KR" altLang="en-US" dirty="0"/>
@@ -2545,11 +2479,11 @@
           </a:lstStyle>
           <a:p>
             <a:r>
-              <a:rPr lang="en-US" altLang="ko-KR" smtClean="0"/>
+              <a:rPr lang="en-US" altLang="ko-KR"/>
               <a:t>C#</a:t>
             </a:r>
             <a:r>
-              <a:rPr lang="ko-KR" altLang="en-US" smtClean="0"/>
+              <a:rPr lang="ko-KR" altLang="en-US"/>
               <a:t>으로 클리커 게임 만들기</a:t>
             </a:r>
             <a:endParaRPr lang="ko-KR" altLang="en-US" dirty="0"/>
@@ -2619,26 +2553,25 @@
           <a:p>
             <a:pPr lvl="0"/>
             <a:r>
-              <a:rPr lang="ko-KR" altLang="en-US" dirty="0" smtClean="0"/>
+              <a:rPr lang="ko-KR" altLang="en-US" dirty="0"/>
               <a:t>문진호</a:t>
             </a:r>
             <a:r>
-              <a:rPr lang="en-US" altLang="ko-KR" dirty="0" smtClean="0"/>
+              <a:rPr lang="en-US" altLang="ko-KR" dirty="0"/>
               <a:t>, </a:t>
             </a:r>
             <a:r>
-              <a:rPr lang="ko-KR" altLang="en-US" dirty="0" err="1" smtClean="0"/>
+              <a:rPr lang="ko-KR" altLang="en-US" dirty="0" err="1"/>
               <a:t>임재민</a:t>
             </a:r>
             <a:r>
-              <a:rPr lang="en-US" altLang="ko-KR" dirty="0" smtClean="0"/>
+              <a:rPr lang="en-US" altLang="ko-KR" dirty="0"/>
               <a:t>, </a:t>
             </a:r>
             <a:r>
-              <a:rPr lang="ko-KR" altLang="en-US" dirty="0" smtClean="0"/>
+              <a:rPr lang="ko-KR" altLang="en-US" dirty="0"/>
               <a:t>연준모</a:t>
             </a:r>
-            <a:endParaRPr lang="ko-KR" altLang="en-US" dirty="0"/>
           </a:p>
         </p:txBody>
       </p:sp>
@@ -2713,19 +2646,19 @@
               <a:buNone/>
             </a:pPr>
             <a:r>
-              <a:rPr lang="en-US" altLang="ko-KR" sz="4400" dirty="0" smtClean="0"/>
+              <a:rPr lang="en-US" altLang="ko-KR" sz="4400" dirty="0"/>
               <a:t>N</a:t>
             </a:r>
             <a:r>
-              <a:rPr lang="ko-KR" altLang="en-US" sz="4400" dirty="0" smtClean="0"/>
+              <a:rPr lang="ko-KR" altLang="en-US" sz="4400" dirty="0"/>
               <a:t>강 </a:t>
             </a:r>
             <a:r>
-              <a:rPr lang="en-US" altLang="ko-KR" sz="4400" dirty="0" smtClean="0"/>
+              <a:rPr lang="en-US" altLang="ko-KR" sz="4400" dirty="0"/>
               <a:t>– </a:t>
             </a:r>
             <a:r>
-              <a:rPr lang="ko-KR" altLang="en-US" sz="4400" dirty="0" err="1" smtClean="0"/>
+              <a:rPr lang="ko-KR" altLang="en-US" sz="4400" dirty="0" err="1"/>
               <a:t>강의명</a:t>
             </a:r>
             <a:endParaRPr lang="ko-KR" altLang="en-US" sz="4400" dirty="0"/>
@@ -2742,13 +2675,6 @@
   <p:clrMapOvr>
     <a:masterClrMapping/>
   </p:clrMapOvr>
-  <p:timing>
-    <p:tnLst>
-      <p:par>
-        <p:cTn id="1" dur="indefinite" restart="never" nodeType="tmRoot"/>
-      </p:par>
-    </p:tnLst>
-  </p:timing>
 </p:sldLayout>
 </file>
 
@@ -2800,10 +2726,9 @@
           <a:lstStyle/>
           <a:p>
             <a:r>
-              <a:rPr lang="ko-KR" altLang="en-US" smtClean="0"/>
+              <a:rPr lang="ko-KR" altLang="en-US"/>
               <a:t>마스터 제목 스타일 편집</a:t>
             </a:r>
-            <a:endParaRPr lang="ko-KR" altLang="en-US"/>
           </a:p>
         </p:txBody>
       </p:sp>
@@ -2834,38 +2759,37 @@
           <a:p>
             <a:pPr lvl="0"/>
             <a:r>
-              <a:rPr lang="ko-KR" altLang="en-US" dirty="0" smtClean="0"/>
+              <a:rPr lang="ko-KR" altLang="en-US" dirty="0"/>
               <a:t>마스터 텍스트 스타일 편집</a:t>
             </a:r>
           </a:p>
           <a:p>
             <a:pPr lvl="1"/>
             <a:r>
-              <a:rPr lang="ko-KR" altLang="en-US" dirty="0" smtClean="0"/>
+              <a:rPr lang="ko-KR" altLang="en-US" dirty="0"/>
               <a:t>둘째 수준</a:t>
             </a:r>
           </a:p>
           <a:p>
             <a:pPr lvl="2"/>
             <a:r>
-              <a:rPr lang="ko-KR" altLang="en-US" dirty="0" smtClean="0"/>
+              <a:rPr lang="ko-KR" altLang="en-US" dirty="0"/>
               <a:t>셋째 수준</a:t>
             </a:r>
           </a:p>
           <a:p>
             <a:pPr lvl="3"/>
             <a:r>
-              <a:rPr lang="ko-KR" altLang="en-US" dirty="0" smtClean="0"/>
+              <a:rPr lang="ko-KR" altLang="en-US" dirty="0"/>
               <a:t>넷째 수준</a:t>
             </a:r>
           </a:p>
           <a:p>
             <a:pPr lvl="4"/>
             <a:r>
-              <a:rPr lang="ko-KR" altLang="en-US" dirty="0" smtClean="0"/>
+              <a:rPr lang="ko-KR" altLang="en-US" dirty="0"/>
               <a:t>다섯째 수준</a:t>
             </a:r>
-            <a:endParaRPr lang="ko-KR" altLang="en-US" dirty="0"/>
           </a:p>
         </p:txBody>
       </p:sp>
@@ -2903,7 +2827,7 @@
           </a:lstStyle>
           <a:p>
             <a:r>
-              <a:rPr lang="en-US" altLang="ko-KR" smtClean="0"/>
+              <a:rPr lang="en-US" altLang="ko-KR"/>
               <a:t>2017</a:t>
             </a:r>
             <a:endParaRPr lang="ko-KR" altLang="en-US" dirty="0"/>
@@ -2944,11 +2868,11 @@
           </a:lstStyle>
           <a:p>
             <a:r>
-              <a:rPr lang="en-US" altLang="ko-KR" smtClean="0"/>
+              <a:rPr lang="en-US" altLang="ko-KR"/>
               <a:t>C#</a:t>
             </a:r>
             <a:r>
-              <a:rPr lang="ko-KR" altLang="en-US" smtClean="0"/>
+              <a:rPr lang="ko-KR" altLang="en-US"/>
               <a:t>으로 클리커 게임 만들기</a:t>
             </a:r>
             <a:endParaRPr lang="ko-KR" altLang="en-US" dirty="0"/>
@@ -3051,13 +2975,6 @@
     <p:sldLayoutId id="2147483695" r:id="rId8"/>
     <p:sldLayoutId id="2147483696" r:id="rId9"/>
   </p:sldLayoutIdLst>
-  <p:timing>
-    <p:tnLst>
-      <p:par>
-        <p:cTn id="1" dur="indefinite" restart="never" nodeType="tmRoot"/>
-      </p:par>
-    </p:tnLst>
-  </p:timing>
   <p:hf hdr="0"/>
   <p:txStyles>
     <p:titleStyle>
@@ -3380,7 +3297,7 @@
           <a:lstStyle/>
           <a:p>
             <a:r>
-              <a:rPr lang="en-US" altLang="ko-KR" smtClean="0"/>
+              <a:rPr lang="en-US" altLang="ko-KR"/>
               <a:t>2017</a:t>
             </a:r>
             <a:endParaRPr lang="ko-KR" altLang="en-US" dirty="0"/>
@@ -3408,11 +3325,11 @@
           <a:lstStyle/>
           <a:p>
             <a:r>
-              <a:rPr lang="en-US" altLang="ko-KR" smtClean="0"/>
+              <a:rPr lang="en-US" altLang="ko-KR"/>
               <a:t>C#</a:t>
             </a:r>
             <a:r>
-              <a:rPr lang="ko-KR" altLang="en-US" smtClean="0"/>
+              <a:rPr lang="ko-KR" altLang="en-US"/>
               <a:t>으로 클리커 게임 만들기</a:t>
             </a:r>
             <a:endParaRPr lang="ko-KR" altLang="en-US" dirty="0"/>
@@ -3458,13 +3375,6 @@
   <p:clrMapOvr>
     <a:masterClrMapping/>
   </p:clrMapOvr>
-  <p:timing>
-    <p:tnLst>
-      <p:par>
-        <p:cTn id="1" dur="indefinite" restart="never" nodeType="tmRoot"/>
-      </p:par>
-    </p:tnLst>
-  </p:timing>
 </p:sld>
 </file>
 
@@ -3501,7 +3411,7 @@
           <a:lstStyle/>
           <a:p>
             <a:r>
-              <a:rPr lang="en-US" altLang="ko-KR" smtClean="0"/>
+              <a:rPr lang="en-US" altLang="ko-KR"/>
               <a:t>2017</a:t>
             </a:r>
             <a:endParaRPr lang="ko-KR" altLang="en-US" dirty="0"/>
@@ -3524,11 +3434,11 @@
           <a:lstStyle/>
           <a:p>
             <a:r>
-              <a:rPr lang="en-US" altLang="ko-KR" smtClean="0"/>
+              <a:rPr lang="en-US" altLang="ko-KR"/>
               <a:t>C#</a:t>
             </a:r>
             <a:r>
-              <a:rPr lang="ko-KR" altLang="en-US" smtClean="0"/>
+              <a:rPr lang="ko-KR" altLang="en-US"/>
               <a:t>으로 클리커 게임 만들기</a:t>
             </a:r>
             <a:endParaRPr lang="ko-KR" altLang="en-US" dirty="0"/>
@@ -3581,7 +3491,7 @@
               <a:t>나는 왜 이 자리에 앉아있는가</a:t>
             </a:r>
             <a:r>
-              <a:rPr lang="en-US" altLang="ko-KR" b="0" dirty="0" smtClean="0"/>
+              <a:rPr lang="en-US" altLang="ko-KR" b="0" dirty="0"/>
               <a:t>?</a:t>
             </a:r>
             <a:endParaRPr lang="ko-KR" altLang="en-US" dirty="0"/>
@@ -3609,10 +3519,10 @@
           <a:lstStyle/>
           <a:p>
             <a:r>
-              <a:rPr lang="ko-KR" altLang="en-US" dirty="0" smtClean="0"/>
+              <a:rPr lang="ko-KR" altLang="en-US" dirty="0"/>
               <a:t>프로그램</a:t>
             </a:r>
-            <a:endParaRPr lang="en-US" altLang="ko-KR" dirty="0" smtClean="0"/>
+            <a:endParaRPr lang="en-US" altLang="ko-KR" dirty="0"/>
           </a:p>
           <a:p>
             <a:pPr lvl="1"/>
@@ -3620,7 +3530,6 @@
               <a:rPr lang="ko-KR" altLang="en-US" dirty="0"/>
               <a:t>어떤 문제를 해결하기 위해 컴퓨터에게 주어지는 처리 방법과 순서를 기술한 일련의 명령문의 집합체</a:t>
             </a:r>
-            <a:endParaRPr lang="ko-KR" altLang="en-US" dirty="0"/>
           </a:p>
         </p:txBody>
       </p:sp>
@@ -3834,7 +3743,7 @@
                                         <p:tgtEl>
                                           <p:spTgt spid="8">
                                             <p:txEl>
-                                              <p:charRg st="5" end="59"/>
+                                              <p:pRg st="1" end="1"/>
                                             </p:txEl>
                                           </p:spTgt>
                                         </p:tgtEl>
@@ -3852,7 +3761,7 @@
                                         <p:tgtEl>
                                           <p:spTgt spid="8">
                                             <p:txEl>
-                                              <p:charRg st="5" end="59"/>
+                                              <p:pRg st="1" end="1"/>
                                             </p:txEl>
                                           </p:spTgt>
                                         </p:tgtEl>
@@ -4137,7 +4046,7 @@
           <a:lstStyle/>
           <a:p>
             <a:r>
-              <a:rPr lang="en-US" altLang="ko-KR" smtClean="0"/>
+              <a:rPr lang="en-US" altLang="ko-KR"/>
               <a:t>2017</a:t>
             </a:r>
             <a:endParaRPr lang="ko-KR" altLang="en-US" dirty="0"/>
@@ -4160,11 +4069,11 @@
           <a:lstStyle/>
           <a:p>
             <a:r>
-              <a:rPr lang="en-US" altLang="ko-KR" smtClean="0"/>
+              <a:rPr lang="en-US" altLang="ko-KR"/>
               <a:t>C#</a:t>
             </a:r>
             <a:r>
-              <a:rPr lang="ko-KR" altLang="en-US" smtClean="0"/>
+              <a:rPr lang="ko-KR" altLang="en-US"/>
               <a:t>으로 클리커 게임 만들기</a:t>
             </a:r>
             <a:endParaRPr lang="ko-KR" altLang="en-US" dirty="0"/>
@@ -4217,7 +4126,7 @@
               <a:t>나는 왜 이 자리에 앉아있는가</a:t>
             </a:r>
             <a:r>
-              <a:rPr lang="en-US" altLang="ko-KR" b="0" dirty="0" smtClean="0"/>
+              <a:rPr lang="en-US" altLang="ko-KR" b="0" dirty="0"/>
               <a:t>?</a:t>
             </a:r>
             <a:endParaRPr lang="ko-KR" altLang="en-US" dirty="0"/>
@@ -4240,11 +4149,11 @@
           <a:lstStyle/>
           <a:p>
             <a:r>
-              <a:rPr lang="ko-KR" altLang="en-US" dirty="0" smtClean="0"/>
+              <a:rPr lang="ko-KR" altLang="en-US" dirty="0"/>
               <a:t>프로그래밍으로 무엇을 만들 수 있을까</a:t>
             </a:r>
             <a:r>
-              <a:rPr lang="en-US" altLang="ko-KR" dirty="0" smtClean="0"/>
+              <a:rPr lang="en-US" altLang="ko-KR" dirty="0"/>
               <a:t>?</a:t>
             </a:r>
             <a:endParaRPr lang="ko-KR" altLang="en-US" dirty="0"/>
@@ -4261,13 +4170,6 @@
   <p:clrMapOvr>
     <a:masterClrMapping/>
   </p:clrMapOvr>
-  <p:timing>
-    <p:tnLst>
-      <p:par>
-        <p:cTn id="1" dur="indefinite" restart="never" nodeType="tmRoot"/>
-      </p:par>
-    </p:tnLst>
-  </p:timing>
 </p:sld>
 </file>
 
@@ -4304,7 +4206,7 @@
           <a:lstStyle/>
           <a:p>
             <a:r>
-              <a:rPr lang="en-US" altLang="ko-KR" smtClean="0"/>
+              <a:rPr lang="en-US" altLang="ko-KR"/>
               <a:t>2017</a:t>
             </a:r>
             <a:endParaRPr lang="ko-KR" altLang="en-US" dirty="0"/>
@@ -4327,11 +4229,11 @@
           <a:lstStyle/>
           <a:p>
             <a:r>
-              <a:rPr lang="en-US" altLang="ko-KR" smtClean="0"/>
+              <a:rPr lang="en-US" altLang="ko-KR"/>
               <a:t>C#</a:t>
             </a:r>
             <a:r>
-              <a:rPr lang="ko-KR" altLang="en-US" smtClean="0"/>
+              <a:rPr lang="ko-KR" altLang="en-US"/>
               <a:t>으로 클리커 게임 만들기</a:t>
             </a:r>
             <a:endParaRPr lang="ko-KR" altLang="en-US" dirty="0"/>
@@ -4384,7 +4286,7 @@
               <a:t>나는 왜 이 자리에 앉아있는가</a:t>
             </a:r>
             <a:r>
-              <a:rPr lang="en-US" altLang="ko-KR" b="0" dirty="0" smtClean="0"/>
+              <a:rPr lang="en-US" altLang="ko-KR" b="0" dirty="0"/>
               <a:t>?</a:t>
             </a:r>
             <a:endParaRPr lang="ko-KR" altLang="en-US" dirty="0"/>
@@ -4407,42 +4309,41 @@
           <a:lstStyle/>
           <a:p>
             <a:r>
-              <a:rPr lang="en-US" altLang="ko-KR" dirty="0" smtClean="0"/>
+              <a:rPr lang="en-US" altLang="ko-KR" dirty="0"/>
               <a:t>10</a:t>
             </a:r>
             <a:r>
-              <a:rPr lang="ko-KR" altLang="en-US" dirty="0" smtClean="0"/>
+              <a:rPr lang="ko-KR" altLang="en-US" dirty="0"/>
               <a:t>차시</a:t>
             </a:r>
-            <a:endParaRPr lang="en-US" altLang="ko-KR" dirty="0" smtClean="0"/>
+            <a:endParaRPr lang="en-US" altLang="ko-KR" dirty="0"/>
           </a:p>
           <a:p>
             <a:pPr lvl="1"/>
             <a:r>
-              <a:rPr lang="ko-KR" altLang="en-US" dirty="0" smtClean="0"/>
+              <a:rPr lang="ko-KR" altLang="en-US" dirty="0"/>
               <a:t>컴퓨터와 친해지자</a:t>
             </a:r>
-            <a:endParaRPr lang="en-US" altLang="ko-KR" dirty="0" smtClean="0"/>
+            <a:endParaRPr lang="en-US" altLang="ko-KR" dirty="0"/>
           </a:p>
           <a:p>
             <a:pPr lvl="1"/>
             <a:r>
-              <a:rPr lang="ko-KR" altLang="en-US" dirty="0" smtClean="0"/>
+              <a:rPr lang="ko-KR" altLang="en-US" dirty="0"/>
               <a:t>프로그래밍을 하자</a:t>
             </a:r>
-            <a:endParaRPr lang="en-US" altLang="ko-KR" dirty="0" smtClean="0"/>
+            <a:endParaRPr lang="en-US" altLang="ko-KR" dirty="0"/>
           </a:p>
           <a:p>
             <a:pPr lvl="1"/>
             <a:r>
-              <a:rPr lang="ko-KR" altLang="en-US" dirty="0" err="1" smtClean="0"/>
+              <a:rPr lang="ko-KR" altLang="en-US" dirty="0" err="1"/>
               <a:t>클리커</a:t>
             </a:r>
             <a:r>
-              <a:rPr lang="ko-KR" altLang="en-US" dirty="0" smtClean="0"/>
+              <a:rPr lang="ko-KR" altLang="en-US" dirty="0"/>
               <a:t> 게임을 만들자</a:t>
             </a:r>
-            <a:endParaRPr lang="ko-KR" altLang="en-US" dirty="0"/>
           </a:p>
         </p:txBody>
       </p:sp>
@@ -4705,7 +4606,7 @@
           <a:lstStyle/>
           <a:p>
             <a:r>
-              <a:rPr lang="en-US" altLang="ko-KR" smtClean="0"/>
+              <a:rPr lang="en-US" altLang="ko-KR"/>
               <a:t>2017</a:t>
             </a:r>
             <a:endParaRPr lang="ko-KR" altLang="en-US" dirty="0"/>
@@ -4728,11 +4629,11 @@
           <a:lstStyle/>
           <a:p>
             <a:r>
-              <a:rPr lang="en-US" altLang="ko-KR" smtClean="0"/>
+              <a:rPr lang="en-US" altLang="ko-KR"/>
               <a:t>C#</a:t>
             </a:r>
             <a:r>
-              <a:rPr lang="ko-KR" altLang="en-US" smtClean="0"/>
+              <a:rPr lang="ko-KR" altLang="en-US"/>
               <a:t>으로 클리커 게임 만들기</a:t>
             </a:r>
             <a:endParaRPr lang="ko-KR" altLang="en-US" dirty="0"/>
@@ -4773,13 +4674,6 @@
   <p:clrMapOvr>
     <a:masterClrMapping/>
   </p:clrMapOvr>
-  <p:timing>
-    <p:tnLst>
-      <p:par>
-        <p:cTn id="1" dur="indefinite" restart="never" nodeType="tmRoot"/>
-      </p:par>
-    </p:tnLst>
-  </p:timing>
 </p:sld>
 </file>
 
@@ -4816,7 +4710,7 @@
           <a:lstStyle/>
           <a:p>
             <a:r>
-              <a:rPr lang="en-US" altLang="ko-KR" smtClean="0"/>
+              <a:rPr lang="en-US" altLang="ko-KR"/>
               <a:t>2017</a:t>
             </a:r>
             <a:endParaRPr lang="ko-KR" altLang="en-US" dirty="0"/>
@@ -4839,11 +4733,11 @@
           <a:lstStyle/>
           <a:p>
             <a:r>
-              <a:rPr lang="en-US" altLang="ko-KR" smtClean="0"/>
+              <a:rPr lang="en-US" altLang="ko-KR"/>
               <a:t>C#</a:t>
             </a:r>
             <a:r>
-              <a:rPr lang="ko-KR" altLang="en-US" smtClean="0"/>
+              <a:rPr lang="ko-KR" altLang="en-US"/>
               <a:t>으로 클리커 게임 만들기</a:t>
             </a:r>
             <a:endParaRPr lang="ko-KR" altLang="en-US" dirty="0"/>
@@ -4896,7 +4790,7 @@
               <a:t>컴퓨터는 무엇인가</a:t>
             </a:r>
             <a:r>
-              <a:rPr lang="en-US" altLang="ko-KR" dirty="0" smtClean="0"/>
+              <a:rPr lang="en-US" altLang="ko-KR" dirty="0"/>
               <a:t>?</a:t>
             </a:r>
             <a:endParaRPr lang="ko-KR" altLang="en-US" dirty="0"/>
@@ -4919,10 +4813,10 @@
           <a:lstStyle/>
           <a:p>
             <a:r>
-              <a:rPr lang="ko-KR" altLang="en-US" dirty="0" smtClean="0"/>
+              <a:rPr lang="ko-KR" altLang="en-US" dirty="0"/>
               <a:t>컴퓨터</a:t>
             </a:r>
-            <a:endParaRPr lang="en-US" altLang="ko-KR" dirty="0" smtClean="0"/>
+            <a:endParaRPr lang="en-US" altLang="ko-KR" dirty="0"/>
           </a:p>
           <a:p>
             <a:pPr lvl="1"/>
@@ -4931,26 +4825,26 @@
               <a:t>논리적 언어로 표현된 계산을 수행하거나 작업을 통제하는 기계다</a:t>
             </a:r>
             <a:r>
-              <a:rPr lang="en-US" altLang="ko-KR" dirty="0" smtClean="0"/>
+              <a:rPr lang="en-US" altLang="ko-KR" dirty="0"/>
               <a:t>.</a:t>
             </a:r>
           </a:p>
           <a:p>
             <a:pPr lvl="1"/>
             <a:r>
-              <a:rPr lang="ko-KR" altLang="en-US" dirty="0" smtClean="0"/>
+              <a:rPr lang="ko-KR" altLang="en-US" dirty="0"/>
               <a:t>쉽게 말해 계산기</a:t>
             </a:r>
-            <a:endParaRPr lang="en-US" altLang="ko-KR" dirty="0" smtClean="0"/>
+            <a:endParaRPr lang="en-US" altLang="ko-KR" dirty="0"/>
           </a:p>
           <a:p>
             <a:pPr lvl="1"/>
             <a:r>
-              <a:rPr lang="ko-KR" altLang="en-US" dirty="0" smtClean="0"/>
+              <a:rPr lang="ko-KR" altLang="en-US" dirty="0"/>
               <a:t>못하는게 없다</a:t>
             </a:r>
             <a:r>
-              <a:rPr lang="en-US" altLang="ko-KR" dirty="0" smtClean="0"/>
+              <a:rPr lang="en-US" altLang="ko-KR" dirty="0"/>
               <a:t>!</a:t>
             </a:r>
             <a:endParaRPr lang="ko-KR" altLang="en-US" dirty="0"/>
@@ -5257,7 +5151,7 @@
           <a:lstStyle/>
           <a:p>
             <a:r>
-              <a:rPr lang="en-US" altLang="ko-KR" smtClean="0"/>
+              <a:rPr lang="en-US" altLang="ko-KR"/>
               <a:t>2017</a:t>
             </a:r>
             <a:endParaRPr lang="ko-KR" altLang="en-US" dirty="0"/>
@@ -5280,11 +5174,11 @@
           <a:lstStyle/>
           <a:p>
             <a:r>
-              <a:rPr lang="en-US" altLang="ko-KR" smtClean="0"/>
+              <a:rPr lang="en-US" altLang="ko-KR"/>
               <a:t>C#</a:t>
             </a:r>
             <a:r>
-              <a:rPr lang="ko-KR" altLang="en-US" smtClean="0"/>
+              <a:rPr lang="ko-KR" altLang="en-US"/>
               <a:t>으로 클리커 게임 만들기</a:t>
             </a:r>
             <a:endParaRPr lang="ko-KR" altLang="en-US" dirty="0"/>
@@ -5331,11 +5225,11 @@
           <a:lstStyle/>
           <a:p>
             <a:r>
-              <a:rPr lang="ko-KR" altLang="en-US" dirty="0" smtClean="0"/>
+              <a:rPr lang="ko-KR" altLang="en-US" dirty="0"/>
               <a:t>컴퓨터는 무엇인가</a:t>
             </a:r>
             <a:r>
-              <a:rPr lang="en-US" altLang="ko-KR" dirty="0" smtClean="0"/>
+              <a:rPr lang="en-US" altLang="ko-KR" dirty="0"/>
               <a:t>?</a:t>
             </a:r>
             <a:endParaRPr lang="ko-KR" altLang="en-US" dirty="0"/>
@@ -5358,11 +5252,11 @@
           <a:lstStyle/>
           <a:p>
             <a:r>
-              <a:rPr lang="ko-KR" altLang="en-US" dirty="0" err="1" smtClean="0"/>
+              <a:rPr lang="ko-KR" altLang="en-US" dirty="0" err="1"/>
               <a:t>에니악</a:t>
             </a:r>
             <a:r>
-              <a:rPr lang="en-US" altLang="ko-KR" dirty="0" smtClean="0"/>
+              <a:rPr lang="en-US" altLang="ko-KR" dirty="0"/>
               <a:t>(1946)</a:t>
             </a:r>
             <a:endParaRPr lang="ko-KR" altLang="en-US" dirty="0"/>
@@ -5379,13 +5273,6 @@
   <p:clrMapOvr>
     <a:masterClrMapping/>
   </p:clrMapOvr>
-  <p:timing>
-    <p:tnLst>
-      <p:par>
-        <p:cTn id="1" dur="indefinite" restart="never" nodeType="tmRoot"/>
-      </p:par>
-    </p:tnLst>
-  </p:timing>
 </p:sld>
 </file>
 
@@ -5422,7 +5309,7 @@
           <a:lstStyle/>
           <a:p>
             <a:r>
-              <a:rPr lang="en-US" altLang="ko-KR" smtClean="0"/>
+              <a:rPr lang="en-US" altLang="ko-KR"/>
               <a:t>2017</a:t>
             </a:r>
             <a:endParaRPr lang="ko-KR" altLang="en-US" dirty="0"/>
@@ -5445,11 +5332,11 @@
           <a:lstStyle/>
           <a:p>
             <a:r>
-              <a:rPr lang="en-US" altLang="ko-KR" smtClean="0"/>
+              <a:rPr lang="en-US" altLang="ko-KR"/>
               <a:t>C#</a:t>
             </a:r>
             <a:r>
-              <a:rPr lang="ko-KR" altLang="en-US" smtClean="0"/>
+              <a:rPr lang="ko-KR" altLang="en-US"/>
               <a:t>으로 클리커 게임 만들기</a:t>
             </a:r>
             <a:endParaRPr lang="ko-KR" altLang="en-US" dirty="0"/>
@@ -5496,11 +5383,11 @@
           <a:lstStyle/>
           <a:p>
             <a:r>
-              <a:rPr lang="ko-KR" altLang="en-US" dirty="0" smtClean="0"/>
+              <a:rPr lang="ko-KR" altLang="en-US" dirty="0"/>
               <a:t>컴퓨터는 무엇인가</a:t>
             </a:r>
             <a:r>
-              <a:rPr lang="en-US" altLang="ko-KR" dirty="0" smtClean="0"/>
+              <a:rPr lang="en-US" altLang="ko-KR" dirty="0"/>
               <a:t>?</a:t>
             </a:r>
             <a:endParaRPr lang="ko-KR" altLang="en-US" dirty="0"/>
@@ -5523,11 +5410,11 @@
           <a:lstStyle/>
           <a:p>
             <a:r>
-              <a:rPr lang="ko-KR" altLang="en-US" dirty="0" smtClean="0"/>
+              <a:rPr lang="ko-KR" altLang="en-US" dirty="0"/>
               <a:t>노트북</a:t>
             </a:r>
             <a:r>
-              <a:rPr lang="en-US" altLang="ko-KR" dirty="0" smtClean="0"/>
+              <a:rPr lang="en-US" altLang="ko-KR" dirty="0"/>
               <a:t>(2017)</a:t>
             </a:r>
             <a:endParaRPr lang="ko-KR" altLang="en-US" dirty="0"/>
@@ -5585,13 +5472,6 @@
   <p:clrMapOvr>
     <a:masterClrMapping/>
   </p:clrMapOvr>
-  <p:timing>
-    <p:tnLst>
-      <p:par>
-        <p:cTn id="1" dur="indefinite" restart="never" nodeType="tmRoot"/>
-      </p:par>
-    </p:tnLst>
-  </p:timing>
 </p:sld>
 </file>
 
@@ -5628,7 +5508,7 @@
           <a:lstStyle/>
           <a:p>
             <a:r>
-              <a:rPr lang="en-US" altLang="ko-KR" smtClean="0"/>
+              <a:rPr lang="en-US" altLang="ko-KR"/>
               <a:t>2017</a:t>
             </a:r>
             <a:endParaRPr lang="ko-KR" altLang="en-US" dirty="0"/>
@@ -5651,11 +5531,11 @@
           <a:lstStyle/>
           <a:p>
             <a:r>
-              <a:rPr lang="en-US" altLang="ko-KR" smtClean="0"/>
+              <a:rPr lang="en-US" altLang="ko-KR"/>
               <a:t>C#</a:t>
             </a:r>
             <a:r>
-              <a:rPr lang="ko-KR" altLang="en-US" smtClean="0"/>
+              <a:rPr lang="ko-KR" altLang="en-US"/>
               <a:t>으로 클리커 게임 만들기</a:t>
             </a:r>
             <a:endParaRPr lang="ko-KR" altLang="en-US" dirty="0"/>
@@ -5771,11 +5651,11 @@
           <a:lstStyle/>
           <a:p>
             <a:r>
-              <a:rPr lang="ko-KR" altLang="en-US" dirty="0" smtClean="0"/>
+              <a:rPr lang="ko-KR" altLang="en-US" dirty="0"/>
               <a:t>컴퓨터는 무엇인가</a:t>
             </a:r>
             <a:r>
-              <a:rPr lang="en-US" altLang="ko-KR" dirty="0" smtClean="0"/>
+              <a:rPr lang="en-US" altLang="ko-KR" dirty="0"/>
               <a:t>?</a:t>
             </a:r>
             <a:endParaRPr lang="ko-KR" altLang="en-US" dirty="0"/>
@@ -5911,7 +5791,7 @@
           <a:lstStyle/>
           <a:p>
             <a:r>
-              <a:rPr lang="en-US" altLang="ko-KR" smtClean="0"/>
+              <a:rPr lang="en-US" altLang="ko-KR"/>
               <a:t>2017</a:t>
             </a:r>
             <a:endParaRPr lang="ko-KR" altLang="en-US" dirty="0"/>
@@ -5934,11 +5814,11 @@
           <a:lstStyle/>
           <a:p>
             <a:r>
-              <a:rPr lang="en-US" altLang="ko-KR" smtClean="0"/>
+              <a:rPr lang="en-US" altLang="ko-KR"/>
               <a:t>C#</a:t>
             </a:r>
             <a:r>
-              <a:rPr lang="ko-KR" altLang="en-US" smtClean="0"/>
+              <a:rPr lang="ko-KR" altLang="en-US"/>
               <a:t>으로 클리커 게임 만들기</a:t>
             </a:r>
             <a:endParaRPr lang="ko-KR" altLang="en-US" dirty="0"/>
@@ -5985,11 +5865,11 @@
           <a:lstStyle/>
           <a:p>
             <a:r>
-              <a:rPr lang="ko-KR" altLang="en-US" dirty="0" smtClean="0"/>
+              <a:rPr lang="ko-KR" altLang="en-US" dirty="0"/>
               <a:t>이제 시작하자</a:t>
             </a:r>
             <a:r>
-              <a:rPr lang="en-US" altLang="ko-KR" dirty="0" smtClean="0"/>
+              <a:rPr lang="en-US" altLang="ko-KR" dirty="0"/>
               <a:t>!</a:t>
             </a:r>
             <a:endParaRPr lang="ko-KR" altLang="en-US" dirty="0"/>
@@ -6012,14 +5892,13 @@
           <a:lstStyle/>
           <a:p>
             <a:r>
-              <a:rPr lang="en-US" altLang="ko-KR" dirty="0" smtClean="0"/>
+              <a:rPr lang="en-US" altLang="ko-KR" dirty="0"/>
               <a:t>Visual studio </a:t>
             </a:r>
             <a:r>
-              <a:rPr lang="ko-KR" altLang="en-US" dirty="0" smtClean="0"/>
+              <a:rPr lang="ko-KR" altLang="en-US" dirty="0"/>
               <a:t>설치</a:t>
             </a:r>
-            <a:endParaRPr lang="ko-KR" altLang="en-US" dirty="0"/>
           </a:p>
         </p:txBody>
       </p:sp>
@@ -6033,13 +5912,6 @@
   <p:clrMapOvr>
     <a:masterClrMapping/>
   </p:clrMapOvr>
-  <p:timing>
-    <p:tnLst>
-      <p:par>
-        <p:cTn id="1" dur="indefinite" restart="never" nodeType="tmRoot"/>
-      </p:par>
-    </p:tnLst>
-  </p:timing>
 </p:sld>
 </file>
 
@@ -6076,7 +5948,7 @@
           <a:lstStyle/>
           <a:p>
             <a:r>
-              <a:rPr lang="en-US" altLang="ko-KR" smtClean="0"/>
+              <a:rPr lang="en-US" altLang="ko-KR"/>
               <a:t>2017</a:t>
             </a:r>
             <a:endParaRPr lang="ko-KR" altLang="en-US" dirty="0"/>
@@ -6099,11 +5971,11 @@
           <a:lstStyle/>
           <a:p>
             <a:r>
-              <a:rPr lang="en-US" altLang="ko-KR" smtClean="0"/>
+              <a:rPr lang="en-US" altLang="ko-KR"/>
               <a:t>C#</a:t>
             </a:r>
             <a:r>
-              <a:rPr lang="ko-KR" altLang="en-US" smtClean="0"/>
+              <a:rPr lang="ko-KR" altLang="en-US"/>
               <a:t>으로 클리커 게임 만들기</a:t>
             </a:r>
             <a:endParaRPr lang="ko-KR" altLang="en-US" dirty="0"/>
@@ -6157,23 +6029,23 @@
           <a:lstStyle/>
           <a:p>
             <a:r>
-              <a:rPr lang="ko-KR" altLang="en-US" sz="2800" dirty="0" smtClean="0"/>
+              <a:rPr lang="ko-KR" altLang="en-US" sz="2800" dirty="0"/>
               <a:t>어쨌든 우리는 </a:t>
             </a:r>
             <a:r>
-              <a:rPr lang="ko-KR" altLang="en-US" sz="2800" dirty="0" err="1" smtClean="0"/>
+              <a:rPr lang="ko-KR" altLang="en-US" sz="2800" dirty="0" err="1"/>
               <a:t>클리커게임을</a:t>
             </a:r>
             <a:r>
-              <a:rPr lang="ko-KR" altLang="en-US" sz="2800" dirty="0" smtClean="0"/>
+              <a:rPr lang="ko-KR" altLang="en-US" sz="2800" dirty="0"/>
               <a:t> </a:t>
             </a:r>
             <a:r>
-              <a:rPr lang="ko-KR" altLang="en-US" sz="2800" dirty="0" err="1" smtClean="0"/>
+              <a:rPr lang="ko-KR" altLang="en-US" sz="2800" dirty="0" err="1"/>
               <a:t>만들거에요</a:t>
             </a:r>
             <a:r>
-              <a:rPr lang="en-US" altLang="ko-KR" sz="2800" dirty="0" smtClean="0"/>
+              <a:rPr lang="en-US" altLang="ko-KR" sz="2800" dirty="0"/>
               <a:t>.</a:t>
             </a:r>
             <a:endParaRPr lang="ko-KR" altLang="en-US" sz="2800" dirty="0"/>
@@ -6196,50 +6068,50 @@
           <a:lstStyle/>
           <a:p>
             <a:r>
-              <a:rPr lang="ko-KR" altLang="en-US" dirty="0" err="1" smtClean="0"/>
+              <a:rPr lang="ko-KR" altLang="en-US" dirty="0" err="1"/>
               <a:t>클리커</a:t>
             </a:r>
             <a:r>
-              <a:rPr lang="ko-KR" altLang="en-US" dirty="0" smtClean="0"/>
+              <a:rPr lang="ko-KR" altLang="en-US" dirty="0"/>
               <a:t> 게임</a:t>
             </a:r>
-            <a:endParaRPr lang="en-US" altLang="ko-KR" dirty="0" smtClean="0"/>
+            <a:endParaRPr lang="en-US" altLang="ko-KR" dirty="0"/>
           </a:p>
           <a:p>
             <a:pPr lvl="1"/>
             <a:r>
-              <a:rPr lang="ko-KR" altLang="en-US" dirty="0" err="1" smtClean="0"/>
+              <a:rPr lang="ko-KR" altLang="en-US" dirty="0" err="1"/>
               <a:t>방치형</a:t>
             </a:r>
             <a:r>
-              <a:rPr lang="ko-KR" altLang="en-US" dirty="0" smtClean="0"/>
+              <a:rPr lang="ko-KR" altLang="en-US" dirty="0"/>
               <a:t> 게임</a:t>
             </a:r>
-            <a:endParaRPr lang="en-US" altLang="ko-KR" dirty="0" smtClean="0"/>
+            <a:endParaRPr lang="en-US" altLang="ko-KR" dirty="0"/>
           </a:p>
           <a:p>
             <a:pPr lvl="1"/>
             <a:r>
-              <a:rPr lang="ko-KR" altLang="en-US" dirty="0" smtClean="0"/>
+              <a:rPr lang="ko-KR" altLang="en-US" dirty="0"/>
               <a:t>터치 위주의 </a:t>
             </a:r>
             <a:r>
-              <a:rPr lang="ko-KR" altLang="en-US" dirty="0" err="1" smtClean="0"/>
+              <a:rPr lang="ko-KR" altLang="en-US" dirty="0" err="1"/>
               <a:t>성장형</a:t>
             </a:r>
             <a:r>
-              <a:rPr lang="ko-KR" altLang="en-US" dirty="0" smtClean="0"/>
+              <a:rPr lang="ko-KR" altLang="en-US" dirty="0"/>
               <a:t> 게임</a:t>
             </a:r>
-            <a:endParaRPr lang="en-US" altLang="ko-KR" dirty="0" smtClean="0"/>
+            <a:endParaRPr lang="en-US" altLang="ko-KR" dirty="0"/>
           </a:p>
           <a:p>
             <a:pPr lvl="1"/>
             <a:r>
-              <a:rPr lang="ko-KR" altLang="en-US" dirty="0" smtClean="0"/>
+              <a:rPr lang="ko-KR" altLang="en-US" dirty="0"/>
               <a:t>시간 때우기 용</a:t>
             </a:r>
-            <a:endParaRPr lang="en-US" altLang="ko-KR" dirty="0" smtClean="0"/>
+            <a:endParaRPr lang="en-US" altLang="ko-KR" dirty="0"/>
           </a:p>
         </p:txBody>
       </p:sp>
@@ -6526,7 +6398,7 @@
           <a:lstStyle/>
           <a:p>
             <a:r>
-              <a:rPr lang="en-US" altLang="ko-KR" smtClean="0"/>
+              <a:rPr lang="en-US" altLang="ko-KR"/>
               <a:t>2017</a:t>
             </a:r>
             <a:endParaRPr lang="ko-KR" altLang="en-US" dirty="0"/>
@@ -6549,11 +6421,11 @@
           <a:lstStyle/>
           <a:p>
             <a:r>
-              <a:rPr lang="en-US" altLang="ko-KR" smtClean="0"/>
+              <a:rPr lang="en-US" altLang="ko-KR"/>
               <a:t>C#</a:t>
             </a:r>
             <a:r>
-              <a:rPr lang="ko-KR" altLang="en-US" smtClean="0"/>
+              <a:rPr lang="ko-KR" altLang="en-US"/>
               <a:t>으로 클리커 게임 만들기</a:t>
             </a:r>
             <a:endParaRPr lang="ko-KR" altLang="en-US" dirty="0"/>
@@ -6628,13 +6500,6 @@
   <p:clrMapOvr>
     <a:masterClrMapping/>
   </p:clrMapOvr>
-  <p:timing>
-    <p:tnLst>
-      <p:par>
-        <p:cTn id="1" dur="indefinite" restart="never" nodeType="tmRoot"/>
-      </p:par>
-    </p:tnLst>
-  </p:timing>
 </p:sld>
 </file>
 
@@ -6671,7 +6536,7 @@
           <a:lstStyle/>
           <a:p>
             <a:r>
-              <a:rPr lang="en-US" altLang="ko-KR" smtClean="0"/>
+              <a:rPr lang="en-US" altLang="ko-KR"/>
               <a:t>2017</a:t>
             </a:r>
             <a:endParaRPr lang="ko-KR" altLang="en-US" dirty="0"/>
@@ -6694,11 +6559,11 @@
           <a:lstStyle/>
           <a:p>
             <a:r>
-              <a:rPr lang="en-US" altLang="ko-KR" smtClean="0"/>
+              <a:rPr lang="en-US" altLang="ko-KR"/>
               <a:t>C#</a:t>
             </a:r>
             <a:r>
-              <a:rPr lang="ko-KR" altLang="en-US" smtClean="0"/>
+              <a:rPr lang="ko-KR" altLang="en-US"/>
               <a:t>으로 클리커 게임 만들기</a:t>
             </a:r>
             <a:endParaRPr lang="ko-KR" altLang="en-US" dirty="0"/>
@@ -6752,23 +6617,23 @@
           <a:lstStyle/>
           <a:p>
             <a:r>
-              <a:rPr lang="ko-KR" altLang="en-US" sz="2800" dirty="0" smtClean="0"/>
+              <a:rPr lang="ko-KR" altLang="en-US" sz="2800" dirty="0"/>
               <a:t>어쨌든 우리는 </a:t>
             </a:r>
             <a:r>
-              <a:rPr lang="ko-KR" altLang="en-US" sz="2800" dirty="0" err="1" smtClean="0"/>
+              <a:rPr lang="ko-KR" altLang="en-US" sz="2800" dirty="0" err="1"/>
               <a:t>클리커게임을</a:t>
             </a:r>
             <a:r>
-              <a:rPr lang="ko-KR" altLang="en-US" sz="2800" dirty="0" smtClean="0"/>
+              <a:rPr lang="ko-KR" altLang="en-US" sz="2800" dirty="0"/>
               <a:t> </a:t>
             </a:r>
             <a:r>
-              <a:rPr lang="ko-KR" altLang="en-US" sz="2800" dirty="0" err="1" smtClean="0"/>
+              <a:rPr lang="ko-KR" altLang="en-US" sz="2800" dirty="0" err="1"/>
               <a:t>만들거에요</a:t>
             </a:r>
             <a:r>
-              <a:rPr lang="en-US" altLang="ko-KR" sz="2800" dirty="0" smtClean="0"/>
+              <a:rPr lang="en-US" altLang="ko-KR" sz="2800" dirty="0"/>
               <a:t>.</a:t>
             </a:r>
             <a:endParaRPr lang="ko-KR" altLang="en-US" sz="2800" dirty="0"/>
@@ -7288,7 +7153,7 @@
           <a:lstStyle/>
           <a:p>
             <a:r>
-              <a:rPr lang="en-US" altLang="ko-KR" smtClean="0"/>
+              <a:rPr lang="en-US" altLang="ko-KR"/>
               <a:t>2017</a:t>
             </a:r>
             <a:endParaRPr lang="ko-KR" altLang="en-US" dirty="0"/>
@@ -7311,11 +7176,11 @@
           <a:lstStyle/>
           <a:p>
             <a:r>
-              <a:rPr lang="en-US" altLang="ko-KR" smtClean="0"/>
+              <a:rPr lang="en-US" altLang="ko-KR"/>
               <a:t>C#</a:t>
             </a:r>
             <a:r>
-              <a:rPr lang="ko-KR" altLang="en-US" smtClean="0"/>
+              <a:rPr lang="ko-KR" altLang="en-US"/>
               <a:t>으로 클리커 게임 만들기</a:t>
             </a:r>
             <a:endParaRPr lang="ko-KR" altLang="en-US" dirty="0"/>
@@ -7362,10 +7227,9 @@
           <a:lstStyle/>
           <a:p>
             <a:r>
-              <a:rPr lang="ko-KR" altLang="en-US" dirty="0" smtClean="0"/>
+              <a:rPr lang="ko-KR" altLang="en-US" dirty="0"/>
               <a:t>프로그램을 만들자</a:t>
             </a:r>
-            <a:endParaRPr lang="ko-KR" altLang="en-US" dirty="0"/>
           </a:p>
         </p:txBody>
       </p:sp>
@@ -7385,21 +7249,20 @@
           <a:lstStyle/>
           <a:p>
             <a:r>
-              <a:rPr lang="ko-KR" altLang="en-US" dirty="0" smtClean="0"/>
+              <a:rPr lang="ko-KR" altLang="en-US" dirty="0"/>
               <a:t>어떻게 만들까</a:t>
             </a:r>
             <a:r>
-              <a:rPr lang="en-US" altLang="ko-KR" dirty="0" smtClean="0"/>
+              <a:rPr lang="en-US" altLang="ko-KR" dirty="0"/>
               <a:t>?</a:t>
             </a:r>
           </a:p>
           <a:p>
             <a:pPr lvl="1"/>
             <a:r>
-              <a:rPr lang="ko-KR" altLang="en-US" dirty="0" smtClean="0"/>
+              <a:rPr lang="ko-KR" altLang="en-US" dirty="0"/>
               <a:t>프로그래밍 언어</a:t>
             </a:r>
-            <a:endParaRPr lang="ko-KR" altLang="en-US" dirty="0"/>
           </a:p>
         </p:txBody>
       </p:sp>
@@ -7718,7 +7581,7 @@
           <a:lstStyle/>
           <a:p>
             <a:r>
-              <a:rPr lang="en-US" altLang="ko-KR" smtClean="0"/>
+              <a:rPr lang="en-US" altLang="ko-KR"/>
               <a:t>2017</a:t>
             </a:r>
             <a:endParaRPr lang="ko-KR" altLang="en-US" dirty="0"/>
@@ -7741,11 +7604,11 @@
           <a:lstStyle/>
           <a:p>
             <a:r>
-              <a:rPr lang="en-US" altLang="ko-KR" smtClean="0"/>
+              <a:rPr lang="en-US" altLang="ko-KR"/>
               <a:t>C#</a:t>
             </a:r>
             <a:r>
-              <a:rPr lang="ko-KR" altLang="en-US" smtClean="0"/>
+              <a:rPr lang="ko-KR" altLang="en-US"/>
               <a:t>으로 클리커 게임 만들기</a:t>
             </a:r>
             <a:endParaRPr lang="ko-KR" altLang="en-US" dirty="0"/>
@@ -7792,10 +7655,9 @@
           <a:lstStyle/>
           <a:p>
             <a:r>
-              <a:rPr lang="ko-KR" altLang="en-US" dirty="0" smtClean="0"/>
+              <a:rPr lang="ko-KR" altLang="en-US" dirty="0"/>
               <a:t>프로그래밍 언어</a:t>
             </a:r>
-            <a:endParaRPr lang="ko-KR" altLang="en-US" dirty="0"/>
           </a:p>
         </p:txBody>
       </p:sp>
@@ -7809,13 +7671,6 @@
   <p:clrMapOvr>
     <a:masterClrMapping/>
   </p:clrMapOvr>
-  <p:timing>
-    <p:tnLst>
-      <p:par>
-        <p:cTn id="1" dur="indefinite" restart="never" nodeType="tmRoot"/>
-      </p:par>
-    </p:tnLst>
-  </p:timing>
 </p:sld>
 </file>
 
@@ -7852,7 +7707,7 @@
           <a:lstStyle/>
           <a:p>
             <a:r>
-              <a:rPr lang="en-US" altLang="ko-KR" smtClean="0"/>
+              <a:rPr lang="en-US" altLang="ko-KR"/>
               <a:t>2017</a:t>
             </a:r>
             <a:endParaRPr lang="ko-KR" altLang="en-US" dirty="0"/>
@@ -7875,11 +7730,11 @@
           <a:lstStyle/>
           <a:p>
             <a:r>
-              <a:rPr lang="en-US" altLang="ko-KR" smtClean="0"/>
+              <a:rPr lang="en-US" altLang="ko-KR"/>
               <a:t>C#</a:t>
             </a:r>
             <a:r>
-              <a:rPr lang="ko-KR" altLang="en-US" smtClean="0"/>
+              <a:rPr lang="ko-KR" altLang="en-US"/>
               <a:t>으로 클리커 게임 만들기</a:t>
             </a:r>
             <a:endParaRPr lang="ko-KR" altLang="en-US" dirty="0"/>
@@ -7926,10 +7781,9 @@
           <a:lstStyle/>
           <a:p>
             <a:r>
-              <a:rPr lang="ko-KR" altLang="en-US" dirty="0" smtClean="0"/>
+              <a:rPr lang="ko-KR" altLang="en-US" dirty="0"/>
               <a:t>프로그래밍 언어</a:t>
             </a:r>
-            <a:endParaRPr lang="ko-KR" altLang="en-US" dirty="0"/>
           </a:p>
         </p:txBody>
       </p:sp>
@@ -7949,40 +7803,40 @@
           <a:lstStyle/>
           <a:p>
             <a:r>
-              <a:rPr lang="ko-KR" altLang="en-US" dirty="0" smtClean="0"/>
+              <a:rPr lang="ko-KR" altLang="en-US" dirty="0"/>
               <a:t>프로그래밍 언어</a:t>
             </a:r>
-            <a:endParaRPr lang="en-US" altLang="ko-KR" dirty="0" smtClean="0"/>
+            <a:endParaRPr lang="en-US" altLang="ko-KR" dirty="0"/>
           </a:p>
           <a:p>
             <a:pPr lvl="1"/>
             <a:r>
-              <a:rPr lang="ko-KR" altLang="en-US" dirty="0" smtClean="0"/>
+              <a:rPr lang="ko-KR" altLang="en-US" dirty="0"/>
               <a:t>컴퓨터와 대화</a:t>
             </a:r>
-            <a:endParaRPr lang="en-US" altLang="ko-KR" dirty="0" smtClean="0"/>
-          </a:p>
-          <a:p>
-            <a:r>
-              <a:rPr lang="en-US" altLang="ko-KR" dirty="0" smtClean="0"/>
+            <a:endParaRPr lang="en-US" altLang="ko-KR" dirty="0"/>
+          </a:p>
+          <a:p>
+            <a:r>
+              <a:rPr lang="en-US" altLang="ko-KR" dirty="0"/>
               <a:t>Visual studio</a:t>
             </a:r>
             <a:r>
-              <a:rPr lang="ko-KR" altLang="en-US" dirty="0" smtClean="0"/>
+              <a:rPr lang="ko-KR" altLang="en-US" dirty="0"/>
               <a:t>는 무엇일까</a:t>
             </a:r>
             <a:r>
-              <a:rPr lang="en-US" altLang="ko-KR" dirty="0" smtClean="0"/>
+              <a:rPr lang="en-US" altLang="ko-KR" dirty="0"/>
               <a:t>?</a:t>
             </a:r>
           </a:p>
           <a:p>
             <a:pPr lvl="1"/>
             <a:r>
-              <a:rPr lang="ko-KR" altLang="en-US" dirty="0" smtClean="0"/>
+              <a:rPr lang="ko-KR" altLang="en-US" dirty="0"/>
               <a:t>프로그램을 만드는 프로그램</a:t>
             </a:r>
-            <a:endParaRPr lang="en-US" altLang="ko-KR" dirty="0" smtClean="0"/>
+            <a:endParaRPr lang="en-US" altLang="ko-KR" dirty="0"/>
           </a:p>
         </p:txBody>
       </p:sp>
@@ -10408,7 +10262,7 @@
           <a:lstStyle/>
           <a:p>
             <a:r>
-              <a:rPr lang="en-US" altLang="ko-KR" smtClean="0"/>
+              <a:rPr lang="en-US" altLang="ko-KR"/>
               <a:t>2017</a:t>
             </a:r>
             <a:endParaRPr lang="ko-KR" altLang="en-US" dirty="0"/>
@@ -10436,11 +10290,11 @@
           <a:lstStyle/>
           <a:p>
             <a:r>
-              <a:rPr lang="en-US" altLang="ko-KR" smtClean="0"/>
+              <a:rPr lang="en-US" altLang="ko-KR"/>
               <a:t>C#</a:t>
             </a:r>
             <a:r>
-              <a:rPr lang="ko-KR" altLang="en-US" smtClean="0"/>
+              <a:rPr lang="ko-KR" altLang="en-US"/>
               <a:t>으로 클리커 게임 만들기</a:t>
             </a:r>
             <a:endParaRPr lang="ko-KR" altLang="en-US" dirty="0"/>
@@ -10486,13 +10340,6 @@
   <p:clrMapOvr>
     <a:masterClrMapping/>
   </p:clrMapOvr>
-  <p:timing>
-    <p:tnLst>
-      <p:par>
-        <p:cTn id="1" dur="indefinite" restart="never" nodeType="tmRoot"/>
-      </p:par>
-    </p:tnLst>
-  </p:timing>
 </p:sld>
 </file>
 
@@ -10531,7 +10378,7 @@
           <a:lstStyle/>
           <a:p>
             <a:r>
-              <a:rPr lang="ko-KR" altLang="en-US" dirty="0" smtClean="0"/>
+              <a:rPr lang="ko-KR" altLang="en-US" dirty="0"/>
               <a:t>소개</a:t>
             </a:r>
             <a:endParaRPr lang="en-US" altLang="ko-KR" dirty="0"/>
@@ -10554,7 +10401,7 @@
           <a:lstStyle/>
           <a:p>
             <a:r>
-              <a:rPr lang="en-US" altLang="ko-KR" smtClean="0"/>
+              <a:rPr lang="en-US" altLang="ko-KR"/>
               <a:t>2017</a:t>
             </a:r>
             <a:endParaRPr lang="ko-KR" altLang="en-US" dirty="0"/>
@@ -10577,11 +10424,11 @@
           <a:lstStyle/>
           <a:p>
             <a:r>
-              <a:rPr lang="en-US" altLang="ko-KR" smtClean="0"/>
+              <a:rPr lang="en-US" altLang="ko-KR"/>
               <a:t>C#</a:t>
             </a:r>
             <a:r>
-              <a:rPr lang="ko-KR" altLang="en-US" smtClean="0"/>
+              <a:rPr lang="ko-KR" altLang="en-US"/>
               <a:t>으로 클리커 게임 만들기</a:t>
             </a:r>
             <a:endParaRPr lang="ko-KR" altLang="en-US" dirty="0"/>
@@ -10628,11 +10475,11 @@
           <a:lstStyle/>
           <a:p>
             <a:r>
-              <a:rPr lang="ko-KR" altLang="en-US" dirty="0" smtClean="0"/>
+              <a:rPr lang="ko-KR" altLang="en-US" dirty="0"/>
               <a:t>우리는 수상한 사람이 아니에요</a:t>
             </a:r>
             <a:r>
-              <a:rPr lang="en-US" altLang="ko-KR" dirty="0" smtClean="0"/>
+              <a:rPr lang="en-US" altLang="ko-KR" dirty="0"/>
               <a:t>!</a:t>
             </a:r>
             <a:endParaRPr lang="ko-KR" altLang="en-US" dirty="0"/>
@@ -10649,13 +10496,6 @@
   <p:clrMapOvr>
     <a:masterClrMapping/>
   </p:clrMapOvr>
-  <p:timing>
-    <p:tnLst>
-      <p:par>
-        <p:cTn id="1" dur="indefinite" restart="never" nodeType="tmRoot"/>
-      </p:par>
-    </p:tnLst>
-  </p:timing>
 </p:sld>
 </file>
 
@@ -10721,7 +10561,7 @@
           <a:lstStyle/>
           <a:p>
             <a:r>
-              <a:rPr lang="en-US" altLang="ko-KR" smtClean="0"/>
+              <a:rPr lang="en-US" altLang="ko-KR"/>
               <a:t>2017</a:t>
             </a:r>
             <a:endParaRPr lang="ko-KR" altLang="en-US" dirty="0"/>
@@ -10744,11 +10584,11 @@
           <a:lstStyle/>
           <a:p>
             <a:r>
-              <a:rPr lang="en-US" altLang="ko-KR" smtClean="0"/>
+              <a:rPr lang="en-US" altLang="ko-KR"/>
               <a:t>C#</a:t>
             </a:r>
             <a:r>
-              <a:rPr lang="ko-KR" altLang="en-US" smtClean="0"/>
+              <a:rPr lang="ko-KR" altLang="en-US"/>
               <a:t>으로 클리커 게임 만들기</a:t>
             </a:r>
             <a:endParaRPr lang="ko-KR" altLang="en-US" dirty="0"/>
@@ -10797,7 +10637,7 @@
           <a:lstStyle/>
           <a:p>
             <a:r>
-              <a:rPr lang="ko-KR" altLang="en-US" dirty="0" err="1" smtClean="0">
+              <a:rPr lang="ko-KR" altLang="en-US" dirty="0" err="1">
                 <a:solidFill>
                   <a:schemeClr val="bg1"/>
                 </a:solidFill>
@@ -10805,18 +10645,13 @@
               <a:t>설리번</a:t>
             </a:r>
             <a:r>
-              <a:rPr lang="ko-KR" altLang="en-US" dirty="0" smtClean="0">
+              <a:rPr lang="ko-KR" altLang="en-US" dirty="0">
                 <a:solidFill>
                   <a:schemeClr val="bg1"/>
                 </a:solidFill>
               </a:rPr>
               <a:t> 프로젝트</a:t>
             </a:r>
-            <a:endParaRPr lang="ko-KR" altLang="en-US" dirty="0">
-              <a:solidFill>
-                <a:schemeClr val="bg1"/>
-              </a:solidFill>
-            </a:endParaRPr>
           </a:p>
         </p:txBody>
       </p:sp>
@@ -10841,36 +10676,6 @@
           <a:bodyPr/>
           <a:lstStyle/>
           <a:p>
-            <a:r>
-              <a:rPr lang="ko-KR" altLang="en-US" b="1" dirty="0" err="1">
-                <a:solidFill>
-                  <a:schemeClr val="bg1"/>
-                </a:solidFill>
-                <a:effectLst>
-                  <a:outerShdw blurRad="38100" dist="38100" dir="2700000" algn="tl">
-                    <a:srgbClr val="000000">
-                      <a:alpha val="43137"/>
-                    </a:srgbClr>
-                  </a:outerShdw>
-                </a:effectLst>
-              </a:rPr>
-              <a:t>설리번</a:t>
-            </a:r>
-            <a:r>
-              <a:rPr lang="ko-KR" altLang="en-US" b="1" dirty="0">
-                <a:solidFill>
-                  <a:schemeClr val="bg1"/>
-                </a:solidFill>
-                <a:effectLst>
-                  <a:outerShdw blurRad="38100" dist="38100" dir="2700000" algn="tl">
-                    <a:srgbClr val="000000">
-                      <a:alpha val="43137"/>
-                    </a:srgbClr>
-                  </a:outerShdw>
-                </a:effectLst>
-              </a:rPr>
-              <a:t> 프로젝트</a:t>
-            </a:r>
             <a:r>
               <a:rPr lang="ko-KR" altLang="en-US" dirty="0">
                 <a:solidFill>
@@ -10884,7 +10689,7 @@
                   </a:outerShdw>
                 </a:effectLst>
               </a:rPr>
-              <a:t>는 프로그래밍에 관심은 많지만 도움을 받지 못하던 지역의 학생들에게 </a:t>
+              <a:t>프로그래밍에 관심은 많지만 도움을 받지 못하던 지역의 학생들에게 </a:t>
             </a:r>
             <a:r>
               <a:rPr lang="ko-KR" altLang="en-US" b="1" dirty="0">
@@ -10947,7 +10752,7 @@
               <a:t> 돕기 위해 시작한 학생 주도의 코딩 교육봉사 프로젝트 입니다</a:t>
             </a:r>
             <a:r>
-              <a:rPr lang="en-US" altLang="ko-KR" dirty="0" smtClean="0">
+              <a:rPr lang="en-US" altLang="ko-KR" dirty="0">
                 <a:solidFill>
                   <a:schemeClr val="bg1"/>
                 </a:solidFill>
@@ -10961,6 +10766,20 @@
               </a:rPr>
               <a:t>.</a:t>
             </a:r>
+          </a:p>
+          <a:p>
+            <a:endParaRPr lang="en-US" altLang="ko-KR" dirty="0">
+              <a:solidFill>
+                <a:schemeClr val="bg1"/>
+              </a:solidFill>
+              <a:effectLst>
+                <a:outerShdw blurRad="38100" dist="38100" dir="2700000" algn="tl">
+                  <a:srgbClr val="000000">
+                    <a:alpha val="43137"/>
+                  </a:srgbClr>
+                </a:outerShdw>
+              </a:effectLst>
+            </a:endParaRPr>
           </a:p>
           <a:p>
             <a:r>
@@ -10994,7 +10813,7 @@
               <a:t>년부터 </a:t>
             </a:r>
             <a:r>
-              <a:rPr lang="ko-KR" altLang="en-US" dirty="0" smtClean="0">
+              <a:rPr lang="ko-KR" altLang="en-US" u="sng" dirty="0">
                 <a:solidFill>
                   <a:schemeClr val="bg1"/>
                 </a:solidFill>
@@ -11006,10 +10825,25 @@
                   </a:outerShdw>
                 </a:effectLst>
               </a:rPr>
-              <a:t>디지털 미디어 고등학교에서 시작하였습니다</a:t>
-            </a:r>
-            <a:r>
-              <a:rPr lang="en-US" altLang="ko-KR" dirty="0" smtClean="0">
+              <a:t>한국디지털미디어고등학교</a:t>
+            </a:r>
+            <a:r>
+              <a:rPr lang="ko-KR" altLang="en-US" dirty="0">
+                <a:solidFill>
+                  <a:schemeClr val="bg1"/>
+                </a:solidFill>
+                <a:effectLst>
+                  <a:outerShdw blurRad="38100" dist="38100" dir="2700000" algn="tl">
+                    <a:srgbClr val="000000">
+                      <a:alpha val="43137"/>
+                    </a:srgbClr>
+                  </a:outerShdw>
+                </a:effectLst>
+              </a:rPr>
+              <a:t>에서 시작하였습니다</a:t>
+            </a:r>
+            <a:r>
+              <a:rPr lang="en-US" altLang="ko-KR" dirty="0">
                 <a:solidFill>
                   <a:schemeClr val="bg1"/>
                 </a:solidFill>
@@ -11048,13 +10882,6 @@
   <p:clrMapOvr>
     <a:masterClrMapping/>
   </p:clrMapOvr>
-  <p:timing>
-    <p:tnLst>
-      <p:par>
-        <p:cTn id="1" dur="indefinite" restart="never" nodeType="tmRoot"/>
-      </p:par>
-    </p:tnLst>
-  </p:timing>
 </p:sld>
 </file>
 
@@ -11091,7 +10918,7 @@
           <a:lstStyle/>
           <a:p>
             <a:r>
-              <a:rPr lang="en-US" altLang="ko-KR" smtClean="0"/>
+              <a:rPr lang="en-US" altLang="ko-KR"/>
               <a:t>2017</a:t>
             </a:r>
             <a:endParaRPr lang="ko-KR" altLang="en-US" dirty="0"/>
@@ -11114,11 +10941,11 @@
           <a:lstStyle/>
           <a:p>
             <a:r>
-              <a:rPr lang="en-US" altLang="ko-KR" smtClean="0"/>
+              <a:rPr lang="en-US" altLang="ko-KR"/>
               <a:t>C#</a:t>
             </a:r>
             <a:r>
-              <a:rPr lang="ko-KR" altLang="en-US" smtClean="0"/>
+              <a:rPr lang="ko-KR" altLang="en-US"/>
               <a:t>으로 클리커 게임 만들기</a:t>
             </a:r>
             <a:endParaRPr lang="ko-KR" altLang="en-US" dirty="0"/>
@@ -11165,14 +10992,13 @@
           <a:lstStyle/>
           <a:p>
             <a:r>
-              <a:rPr lang="ko-KR" altLang="en-US" dirty="0" err="1" smtClean="0"/>
+              <a:rPr lang="ko-KR" altLang="en-US" dirty="0" err="1"/>
               <a:t>강의자</a:t>
             </a:r>
             <a:r>
-              <a:rPr lang="ko-KR" altLang="en-US" dirty="0" smtClean="0"/>
+              <a:rPr lang="ko-KR" altLang="en-US" dirty="0"/>
               <a:t> 문진호</a:t>
             </a:r>
-            <a:endParaRPr lang="ko-KR" altLang="en-US" dirty="0"/>
           </a:p>
         </p:txBody>
       </p:sp>
@@ -11192,10 +11018,9 @@
           <a:lstStyle/>
           <a:p>
             <a:r>
-              <a:rPr lang="ko-KR" altLang="en-US" dirty="0" smtClean="0"/>
+              <a:rPr lang="ko-KR" altLang="en-US" dirty="0"/>
               <a:t>설명</a:t>
             </a:r>
-            <a:endParaRPr lang="ko-KR" altLang="en-US" dirty="0"/>
           </a:p>
         </p:txBody>
       </p:sp>
@@ -11245,7 +11070,7 @@
           <a:lstStyle/>
           <a:p>
             <a:r>
-              <a:rPr lang="en-US" altLang="ko-KR" smtClean="0"/>
+              <a:rPr lang="en-US" altLang="ko-KR"/>
               <a:t>2017</a:t>
             </a:r>
             <a:endParaRPr lang="ko-KR" altLang="en-US" dirty="0"/>
@@ -11268,11 +11093,11 @@
           <a:lstStyle/>
           <a:p>
             <a:r>
-              <a:rPr lang="en-US" altLang="ko-KR" smtClean="0"/>
+              <a:rPr lang="en-US" altLang="ko-KR"/>
               <a:t>C#</a:t>
             </a:r>
             <a:r>
-              <a:rPr lang="ko-KR" altLang="en-US" smtClean="0"/>
+              <a:rPr lang="ko-KR" altLang="en-US"/>
               <a:t>으로 클리커 게임 만들기</a:t>
             </a:r>
             <a:endParaRPr lang="ko-KR" altLang="en-US" dirty="0"/>
@@ -11319,15 +11144,15 @@
           <a:lstStyle/>
           <a:p>
             <a:r>
-              <a:rPr lang="ko-KR" altLang="en-US" dirty="0" err="1" smtClean="0"/>
+              <a:rPr lang="ko-KR" altLang="en-US" dirty="0" err="1"/>
               <a:t>강의자</a:t>
             </a:r>
             <a:r>
-              <a:rPr lang="ko-KR" altLang="en-US" dirty="0" smtClean="0"/>
+              <a:rPr lang="ko-KR" altLang="en-US" dirty="0"/>
               <a:t> </a:t>
             </a:r>
             <a:r>
-              <a:rPr lang="ko-KR" altLang="en-US" dirty="0" err="1" smtClean="0"/>
+              <a:rPr lang="ko-KR" altLang="en-US" dirty="0" err="1"/>
               <a:t>임재민</a:t>
             </a:r>
             <a:endParaRPr lang="ko-KR" altLang="en-US" dirty="0"/>
@@ -11350,10 +11175,9 @@
           <a:lstStyle/>
           <a:p>
             <a:r>
-              <a:rPr lang="ko-KR" altLang="en-US" dirty="0" smtClean="0"/>
+              <a:rPr lang="ko-KR" altLang="en-US" dirty="0"/>
               <a:t>설명</a:t>
             </a:r>
-            <a:endParaRPr lang="ko-KR" altLang="en-US" dirty="0"/>
           </a:p>
         </p:txBody>
       </p:sp>
@@ -11403,7 +11227,7 @@
           <a:lstStyle/>
           <a:p>
             <a:r>
-              <a:rPr lang="en-US" altLang="ko-KR" smtClean="0"/>
+              <a:rPr lang="en-US" altLang="ko-KR"/>
               <a:t>2017</a:t>
             </a:r>
             <a:endParaRPr lang="ko-KR" altLang="en-US" dirty="0"/>
@@ -11426,11 +11250,11 @@
           <a:lstStyle/>
           <a:p>
             <a:r>
-              <a:rPr lang="en-US" altLang="ko-KR" smtClean="0"/>
+              <a:rPr lang="en-US" altLang="ko-KR"/>
               <a:t>C#</a:t>
             </a:r>
             <a:r>
-              <a:rPr lang="ko-KR" altLang="en-US" smtClean="0"/>
+              <a:rPr lang="ko-KR" altLang="en-US"/>
               <a:t>으로 클리커 게임 만들기</a:t>
             </a:r>
             <a:endParaRPr lang="ko-KR" altLang="en-US" dirty="0"/>
@@ -11477,14 +11301,13 @@
           <a:lstStyle/>
           <a:p>
             <a:r>
-              <a:rPr lang="ko-KR" altLang="en-US" dirty="0" err="1" smtClean="0"/>
+              <a:rPr lang="ko-KR" altLang="en-US" dirty="0" err="1"/>
               <a:t>강의자</a:t>
             </a:r>
             <a:r>
-              <a:rPr lang="ko-KR" altLang="en-US" dirty="0" smtClean="0"/>
+              <a:rPr lang="ko-KR" altLang="en-US" dirty="0"/>
               <a:t> 연준모</a:t>
             </a:r>
-            <a:endParaRPr lang="ko-KR" altLang="en-US" dirty="0"/>
           </a:p>
         </p:txBody>
       </p:sp>
@@ -11506,80 +11329,80 @@
           <a:lstStyle/>
           <a:p>
             <a:r>
-              <a:rPr lang="ko-KR" altLang="en-US" sz="2400" dirty="0" smtClean="0"/>
+              <a:rPr lang="ko-KR" altLang="en-US" sz="2400" dirty="0"/>
               <a:t>대덕소프트웨어 </a:t>
             </a:r>
             <a:r>
-              <a:rPr lang="ko-KR" altLang="en-US" sz="2400" dirty="0" err="1" smtClean="0"/>
+              <a:rPr lang="ko-KR" altLang="en-US" sz="2400" dirty="0" err="1"/>
               <a:t>마이스터</a:t>
             </a:r>
             <a:r>
-              <a:rPr lang="ko-KR" altLang="en-US" sz="2400" dirty="0" smtClean="0"/>
+              <a:rPr lang="ko-KR" altLang="en-US" sz="2400" dirty="0"/>
               <a:t> 고등학교 </a:t>
             </a:r>
             <a:r>
-              <a:rPr lang="en-US" altLang="ko-KR" sz="2400" dirty="0" smtClean="0"/>
+              <a:rPr lang="en-US" altLang="ko-KR" sz="2400" dirty="0"/>
               <a:t>1</a:t>
             </a:r>
             <a:r>
-              <a:rPr lang="ko-KR" altLang="en-US" sz="2400" dirty="0" smtClean="0"/>
+              <a:rPr lang="ko-KR" altLang="en-US" sz="2400" dirty="0"/>
               <a:t>학년</a:t>
             </a:r>
-            <a:endParaRPr lang="en-US" altLang="ko-KR" sz="2400" dirty="0" smtClean="0"/>
-          </a:p>
-          <a:p>
-            <a:r>
-              <a:rPr lang="ko-KR" altLang="en-US" sz="2400" dirty="0" smtClean="0"/>
+            <a:endParaRPr lang="en-US" altLang="ko-KR" sz="2400" dirty="0"/>
+          </a:p>
+          <a:p>
+            <a:r>
+              <a:rPr lang="ko-KR" altLang="en-US" sz="2400" dirty="0"/>
               <a:t>만들어본 프로그램</a:t>
             </a:r>
-            <a:endParaRPr lang="en-US" altLang="ko-KR" sz="2400" dirty="0" smtClean="0"/>
+            <a:endParaRPr lang="en-US" altLang="ko-KR" sz="2400" dirty="0"/>
           </a:p>
           <a:p>
             <a:pPr lvl="1"/>
             <a:r>
-              <a:rPr lang="ko-KR" altLang="en-US" sz="2000" dirty="0" err="1" smtClean="0"/>
+              <a:rPr lang="ko-KR" altLang="en-US" sz="2000" dirty="0" err="1"/>
               <a:t>로그라이크</a:t>
             </a:r>
             <a:r>
-              <a:rPr lang="ko-KR" altLang="en-US" sz="2000" dirty="0" smtClean="0"/>
+              <a:rPr lang="ko-KR" altLang="en-US" sz="2000" dirty="0"/>
               <a:t> 게임</a:t>
             </a:r>
-            <a:endParaRPr lang="en-US" altLang="ko-KR" sz="2000" dirty="0" smtClean="0"/>
+            <a:endParaRPr lang="en-US" altLang="ko-KR" sz="2000" dirty="0"/>
           </a:p>
           <a:p>
             <a:pPr lvl="1"/>
             <a:r>
-              <a:rPr lang="ko-KR" altLang="en-US" sz="2000" dirty="0" smtClean="0"/>
+              <a:rPr lang="ko-KR" altLang="en-US" sz="2000" dirty="0"/>
               <a:t>웹 디자인 툴</a:t>
             </a:r>
             <a:r>
-              <a:rPr lang="en-US" altLang="ko-KR" sz="2000" dirty="0" smtClean="0"/>
+              <a:rPr lang="en-US" altLang="ko-KR" sz="2000" dirty="0"/>
               <a:t>(CSS maker)</a:t>
             </a:r>
           </a:p>
           <a:p>
             <a:pPr lvl="1"/>
             <a:r>
-              <a:rPr lang="ko-KR" altLang="en-US" sz="2000" dirty="0" err="1" smtClean="0"/>
+              <a:rPr lang="ko-KR" altLang="en-US" sz="2000" dirty="0" err="1"/>
               <a:t>대마위키</a:t>
             </a:r>
             <a:r>
-              <a:rPr lang="ko-KR" altLang="en-US" sz="2000" dirty="0" smtClean="0"/>
+              <a:rPr lang="ko-KR" altLang="en-US" sz="2000" dirty="0"/>
               <a:t> 페이지</a:t>
             </a:r>
-            <a:endParaRPr lang="en-US" altLang="ko-KR" sz="2000" dirty="0" smtClean="0"/>
+            <a:endParaRPr lang="en-US" altLang="ko-KR" sz="2000" dirty="0"/>
           </a:p>
           <a:p>
             <a:pPr lvl="1"/>
             <a:r>
-              <a:rPr lang="en-US" altLang="ko-KR" sz="2000" dirty="0" smtClean="0"/>
+              <a:rPr lang="en-US" altLang="ko-KR" sz="2000" dirty="0"/>
               <a:t>CTF </a:t>
             </a:r>
             <a:r>
-              <a:rPr lang="ko-KR" altLang="en-US" sz="2000" dirty="0" smtClean="0"/>
+              <a:rPr lang="ko-KR" altLang="en-US" sz="2000" dirty="0"/>
               <a:t>페이지</a:t>
             </a:r>
-            <a:endParaRPr lang="en-US" altLang="ko-KR" sz="2000" dirty="0" smtClean="0"/>
+            <a:endParaRPr lang="en-US" altLang="ko-KR" sz="2000" dirty="0"/>
           </a:p>
           <a:p>
             <a:pPr lvl="1"/>
@@ -11674,7 +11497,7 @@
           <a:lstStyle/>
           <a:p>
             <a:r>
-              <a:rPr lang="en-US" altLang="ko-KR" smtClean="0"/>
+              <a:rPr lang="en-US" altLang="ko-KR"/>
               <a:t>2017</a:t>
             </a:r>
             <a:endParaRPr lang="ko-KR" altLang="en-US" dirty="0"/>
@@ -11697,11 +11520,11 @@
           <a:lstStyle/>
           <a:p>
             <a:r>
-              <a:rPr lang="en-US" altLang="ko-KR" smtClean="0"/>
+              <a:rPr lang="en-US" altLang="ko-KR"/>
               <a:t>C#</a:t>
             </a:r>
             <a:r>
-              <a:rPr lang="ko-KR" altLang="en-US" smtClean="0"/>
+              <a:rPr lang="ko-KR" altLang="en-US"/>
               <a:t>으로 클리커 게임 만들기</a:t>
             </a:r>
             <a:endParaRPr lang="ko-KR" altLang="en-US" dirty="0"/>
@@ -11769,26 +11592,21 @@
           <a:lstStyle/>
           <a:p>
             <a:r>
-              <a:rPr lang="en-US" altLang="ko-KR" dirty="0" smtClean="0"/>
+              <a:rPr lang="en-US" altLang="ko-KR" dirty="0"/>
               <a:t>1</a:t>
             </a:r>
             <a:r>
-              <a:rPr lang="ko-KR" altLang="en-US" dirty="0" smtClean="0"/>
+              <a:rPr lang="ko-KR" altLang="en-US" dirty="0"/>
               <a:t>강 </a:t>
             </a:r>
             <a:r>
-              <a:rPr lang="en-US" altLang="ko-KR" dirty="0" smtClean="0"/>
+              <a:rPr lang="en-US" altLang="ko-KR" dirty="0"/>
               <a:t>- </a:t>
             </a:r>
             <a:r>
               <a:rPr lang="ko-KR" altLang="en-US" dirty="0"/>
-              <a:t>프로그래밍 </a:t>
-            </a:r>
-            <a:r>
-              <a:rPr lang="ko-KR" altLang="en-US" dirty="0" smtClean="0"/>
-              <a:t>입문</a:t>
-            </a:r>
-            <a:endParaRPr lang="ko-KR" altLang="en-US" dirty="0"/>
+              <a:t>프로그래밍 입문</a:t>
+            </a:r>
           </a:p>
         </p:txBody>
       </p:sp>
@@ -11802,13 +11620,6 @@
   <p:clrMapOvr>
     <a:masterClrMapping/>
   </p:clrMapOvr>
-  <p:timing>
-    <p:tnLst>
-      <p:par>
-        <p:cTn id="1" dur="indefinite" restart="never" nodeType="tmRoot"/>
-      </p:par>
-    </p:tnLst>
-  </p:timing>
 </p:sld>
 </file>
 
@@ -11845,7 +11656,7 @@
           <a:lstStyle/>
           <a:p>
             <a:r>
-              <a:rPr lang="en-US" altLang="ko-KR" smtClean="0"/>
+              <a:rPr lang="en-US" altLang="ko-KR"/>
               <a:t>2017</a:t>
             </a:r>
             <a:endParaRPr lang="ko-KR" altLang="en-US" dirty="0"/>
@@ -11868,11 +11679,11 @@
           <a:lstStyle/>
           <a:p>
             <a:r>
-              <a:rPr lang="en-US" altLang="ko-KR" smtClean="0"/>
+              <a:rPr lang="en-US" altLang="ko-KR"/>
               <a:t>C#</a:t>
             </a:r>
             <a:r>
-              <a:rPr lang="ko-KR" altLang="en-US" smtClean="0"/>
+              <a:rPr lang="ko-KR" altLang="en-US"/>
               <a:t>으로 클리커 게임 만들기</a:t>
             </a:r>
             <a:endParaRPr lang="ko-KR" altLang="en-US" dirty="0"/>
@@ -11925,7 +11736,7 @@
               <a:t>나는 왜 이 자리에 앉아있는가</a:t>
             </a:r>
             <a:r>
-              <a:rPr lang="en-US" altLang="ko-KR" b="0" dirty="0" smtClean="0"/>
+              <a:rPr lang="en-US" altLang="ko-KR" b="0" dirty="0"/>
               <a:t>?</a:t>
             </a:r>
             <a:endParaRPr lang="ko-KR" altLang="en-US" dirty="0"/>
@@ -11953,19 +11764,19 @@
           <a:lstStyle/>
           <a:p>
             <a:r>
-              <a:rPr lang="ko-KR" altLang="en-US" dirty="0" smtClean="0"/>
+              <a:rPr lang="ko-KR" altLang="en-US" dirty="0"/>
               <a:t>프로그래밍</a:t>
             </a:r>
             <a:r>
-              <a:rPr lang="en-US" altLang="ko-KR" dirty="0" smtClean="0"/>
+              <a:rPr lang="en-US" altLang="ko-KR" dirty="0"/>
               <a:t>(</a:t>
             </a:r>
             <a:r>
-              <a:rPr lang="ko-KR" altLang="en-US" dirty="0" smtClean="0"/>
+              <a:rPr lang="ko-KR" altLang="en-US" dirty="0"/>
               <a:t>코딩</a:t>
             </a:r>
             <a:r>
-              <a:rPr lang="en-US" altLang="ko-KR" dirty="0" smtClean="0"/>
+              <a:rPr lang="en-US" altLang="ko-KR" dirty="0"/>
               <a:t>)</a:t>
             </a:r>
           </a:p>

</xml_diff>